<commit_message>
Changes to figure captions and figure 1
</commit_message>
<xml_diff>
--- a/conceptual paper/figures/figs.pptx
+++ b/conceptual paper/figures/figs.pptx
@@ -5,7 +5,7 @@
     <p:sldMasterId id="2147483648" r:id="rId1"/>
   </p:sldMasterIdLst>
   <p:notesMasterIdLst>
-    <p:notesMasterId r:id="rId17"/>
+    <p:notesMasterId r:id="rId18"/>
   </p:notesMasterIdLst>
   <p:sldIdLst>
     <p:sldId id="256" r:id="rId2"/>
@@ -17,12 +17,13 @@
     <p:sldId id="263" r:id="rId8"/>
     <p:sldId id="268" r:id="rId9"/>
     <p:sldId id="267" r:id="rId10"/>
-    <p:sldId id="269" r:id="rId11"/>
-    <p:sldId id="270" r:id="rId12"/>
-    <p:sldId id="271" r:id="rId13"/>
-    <p:sldId id="272" r:id="rId14"/>
-    <p:sldId id="273" r:id="rId15"/>
-    <p:sldId id="274" r:id="rId16"/>
+    <p:sldId id="275" r:id="rId11"/>
+    <p:sldId id="272" r:id="rId12"/>
+    <p:sldId id="269" r:id="rId13"/>
+    <p:sldId id="270" r:id="rId14"/>
+    <p:sldId id="271" r:id="rId15"/>
+    <p:sldId id="273" r:id="rId16"/>
+    <p:sldId id="274" r:id="rId17"/>
   </p:sldIdLst>
   <p:sldSz cx="9144000" cy="6858000" type="screen4x3"/>
   <p:notesSz cx="6858000" cy="9144000"/>
@@ -206,7 +207,7 @@
           <a:p>
             <a:fld id="{4FBAF265-6143-EA4D-80A4-B61958D9683D}" type="datetimeFigureOut">
               <a:rPr lang="en-US" smtClean="0"/>
-              <a:t>18-10-15</a:t>
+              <a:t>19-02-11</a:t>
             </a:fld>
             <a:endParaRPr lang="en-US"/>
           </a:p>
@@ -857,7 +858,108 @@
           <a:p>
             <a:fld id="{D822DB65-632D-0F4F-9C2E-F1160E33CD9A}" type="slidenum">
               <a:rPr lang="en-US" smtClean="0"/>
-              <a:t>13</a:t>
+              <a:t>10</a:t>
+            </a:fld>
+            <a:endParaRPr lang="en-US"/>
+          </a:p>
+        </p:txBody>
+      </p:sp>
+    </p:spTree>
+    <p:extLst>
+      <p:ext uri="{BB962C8B-B14F-4D97-AF65-F5344CB8AC3E}">
+        <p14:creationId xmlns:p14="http://schemas.microsoft.com/office/powerpoint/2010/main" val="2377881378"/>
+      </p:ext>
+    </p:extLst>
+  </p:cSld>
+  <p:clrMapOvr>
+    <a:masterClrMapping/>
+  </p:clrMapOvr>
+</p:notes>
+</file>
+
+<file path=ppt/notesSlides/notesSlide5.xml><?xml version="1.0" encoding="utf-8"?>
+<p:notes xmlns:a="http://schemas.openxmlformats.org/drawingml/2006/main" xmlns:r="http://schemas.openxmlformats.org/officeDocument/2006/relationships" xmlns:p="http://schemas.openxmlformats.org/presentationml/2006/main">
+  <p:cSld>
+    <p:spTree>
+      <p:nvGrpSpPr>
+        <p:cNvPr id="1" name=""/>
+        <p:cNvGrpSpPr/>
+        <p:nvPr/>
+      </p:nvGrpSpPr>
+      <p:grpSpPr>
+        <a:xfrm>
+          <a:off x="0" y="0"/>
+          <a:ext cx="0" cy="0"/>
+          <a:chOff x="0" y="0"/>
+          <a:chExt cx="0" cy="0"/>
+        </a:xfrm>
+      </p:grpSpPr>
+      <p:sp>
+        <p:nvSpPr>
+          <p:cNvPr id="2" name="Slide Image Placeholder 1"/>
+          <p:cNvSpPr>
+            <a:spLocks noGrp="1" noRot="1" noChangeAspect="1"/>
+          </p:cNvSpPr>
+          <p:nvPr>
+            <p:ph type="sldImg"/>
+          </p:nvPr>
+        </p:nvSpPr>
+        <p:spPr/>
+      </p:sp>
+      <p:sp>
+        <p:nvSpPr>
+          <p:cNvPr id="3" name="Notes Placeholder 2"/>
+          <p:cNvSpPr>
+            <a:spLocks noGrp="1"/>
+          </p:cNvSpPr>
+          <p:nvPr>
+            <p:ph type="body" idx="1"/>
+          </p:nvPr>
+        </p:nvSpPr>
+        <p:spPr/>
+        <p:txBody>
+          <a:bodyPr/>
+          <a:lstStyle/>
+          <a:p>
+            <a:r>
+              <a:rPr lang="en-US" dirty="0" smtClean="0"/>
+              <a:t>Figure 1 caption:</a:t>
+            </a:r>
+          </a:p>
+          <a:p>
+            <a:r>
+              <a:rPr lang="en-US" dirty="0" smtClean="0"/>
+              <a:t>A schematic representation of Cushing’s match-mismatch</a:t>
+            </a:r>
+            <a:r>
+              <a:rPr lang="en-US" baseline="0" dirty="0" smtClean="0"/>
+              <a:t> hypothesis pre-climate change (i.e. a ‘match’) (a) and under two different climate change scenarios: the consumer shifts its phenology more (b) or less than its resource (c) leading to a ‘mismatch’ in both cases (d). Red represents the consumer and black represents the resource.</a:t>
+            </a:r>
+            <a:endParaRPr lang="en-US" dirty="0" smtClean="0"/>
+          </a:p>
+          <a:p>
+            <a:endParaRPr lang="en-US" dirty="0"/>
+          </a:p>
+        </p:txBody>
+      </p:sp>
+      <p:sp>
+        <p:nvSpPr>
+          <p:cNvPr id="4" name="Slide Number Placeholder 3"/>
+          <p:cNvSpPr>
+            <a:spLocks noGrp="1"/>
+          </p:cNvSpPr>
+          <p:nvPr>
+            <p:ph type="sldNum" sz="quarter" idx="10"/>
+          </p:nvPr>
+        </p:nvSpPr>
+        <p:spPr/>
+        <p:txBody>
+          <a:bodyPr/>
+          <a:lstStyle/>
+          <a:p>
+            <a:fld id="{D822DB65-632D-0F4F-9C2E-F1160E33CD9A}" type="slidenum">
+              <a:rPr lang="en-US" smtClean="0"/>
+              <a:t>11</a:t>
             </a:fld>
             <a:endParaRPr lang="en-US"/>
           </a:p>
@@ -1057,7 +1159,7 @@
           <a:p>
             <a:fld id="{7F396B13-CEA0-E54F-B6C3-F031D24201ED}" type="datetimeFigureOut">
               <a:rPr lang="en-US" smtClean="0"/>
-              <a:t>18-10-15</a:t>
+              <a:t>19-02-11</a:t>
             </a:fld>
             <a:endParaRPr lang="en-US"/>
           </a:p>
@@ -1227,7 +1329,7 @@
           <a:p>
             <a:fld id="{7F396B13-CEA0-E54F-B6C3-F031D24201ED}" type="datetimeFigureOut">
               <a:rPr lang="en-US" smtClean="0"/>
-              <a:t>18-10-15</a:t>
+              <a:t>19-02-11</a:t>
             </a:fld>
             <a:endParaRPr lang="en-US"/>
           </a:p>
@@ -1407,7 +1509,7 @@
           <a:p>
             <a:fld id="{7F396B13-CEA0-E54F-B6C3-F031D24201ED}" type="datetimeFigureOut">
               <a:rPr lang="en-US" smtClean="0"/>
-              <a:t>18-10-15</a:t>
+              <a:t>19-02-11</a:t>
             </a:fld>
             <a:endParaRPr lang="en-US"/>
           </a:p>
@@ -1577,7 +1679,7 @@
           <a:p>
             <a:fld id="{7F396B13-CEA0-E54F-B6C3-F031D24201ED}" type="datetimeFigureOut">
               <a:rPr lang="en-US" smtClean="0"/>
-              <a:t>18-10-15</a:t>
+              <a:t>19-02-11</a:t>
             </a:fld>
             <a:endParaRPr lang="en-US"/>
           </a:p>
@@ -1823,7 +1925,7 @@
           <a:p>
             <a:fld id="{7F396B13-CEA0-E54F-B6C3-F031D24201ED}" type="datetimeFigureOut">
               <a:rPr lang="en-US" smtClean="0"/>
-              <a:t>18-10-15</a:t>
+              <a:t>19-02-11</a:t>
             </a:fld>
             <a:endParaRPr lang="en-US"/>
           </a:p>
@@ -2111,7 +2213,7 @@
           <a:p>
             <a:fld id="{7F396B13-CEA0-E54F-B6C3-F031D24201ED}" type="datetimeFigureOut">
               <a:rPr lang="en-US" smtClean="0"/>
-              <a:t>18-10-15</a:t>
+              <a:t>19-02-11</a:t>
             </a:fld>
             <a:endParaRPr lang="en-US"/>
           </a:p>
@@ -2533,7 +2635,7 @@
           <a:p>
             <a:fld id="{7F396B13-CEA0-E54F-B6C3-F031D24201ED}" type="datetimeFigureOut">
               <a:rPr lang="en-US" smtClean="0"/>
-              <a:t>18-10-15</a:t>
+              <a:t>19-02-11</a:t>
             </a:fld>
             <a:endParaRPr lang="en-US"/>
           </a:p>
@@ -2651,7 +2753,7 @@
           <a:p>
             <a:fld id="{7F396B13-CEA0-E54F-B6C3-F031D24201ED}" type="datetimeFigureOut">
               <a:rPr lang="en-US" smtClean="0"/>
-              <a:t>18-10-15</a:t>
+              <a:t>19-02-11</a:t>
             </a:fld>
             <a:endParaRPr lang="en-US"/>
           </a:p>
@@ -2746,7 +2848,7 @@
           <a:p>
             <a:fld id="{7F396B13-CEA0-E54F-B6C3-F031D24201ED}" type="datetimeFigureOut">
               <a:rPr lang="en-US" smtClean="0"/>
-              <a:t>18-10-15</a:t>
+              <a:t>19-02-11</a:t>
             </a:fld>
             <a:endParaRPr lang="en-US"/>
           </a:p>
@@ -3023,7 +3125,7 @@
           <a:p>
             <a:fld id="{7F396B13-CEA0-E54F-B6C3-F031D24201ED}" type="datetimeFigureOut">
               <a:rPr lang="en-US" smtClean="0"/>
-              <a:t>18-10-15</a:t>
+              <a:t>19-02-11</a:t>
             </a:fld>
             <a:endParaRPr lang="en-US"/>
           </a:p>
@@ -3276,7 +3378,7 @@
           <a:p>
             <a:fld id="{7F396B13-CEA0-E54F-B6C3-F031D24201ED}" type="datetimeFigureOut">
               <a:rPr lang="en-US" smtClean="0"/>
-              <a:t>18-10-15</a:t>
+              <a:t>19-02-11</a:t>
             </a:fld>
             <a:endParaRPr lang="en-US"/>
           </a:p>
@@ -3489,7 +3591,7 @@
           <a:p>
             <a:fld id="{7F396B13-CEA0-E54F-B6C3-F031D24201ED}" type="datetimeFigureOut">
               <a:rPr lang="en-US" smtClean="0"/>
-              <a:t>18-10-15</a:t>
+              <a:t>19-02-11</a:t>
             </a:fld>
             <a:endParaRPr lang="en-US"/>
           </a:p>
@@ -4350,6 +4452,2438 @@
           <a:chExt cx="0" cy="0"/>
         </a:xfrm>
       </p:grpSpPr>
+      <p:sp>
+        <p:nvSpPr>
+          <p:cNvPr id="2" name="Rectangle 1"/>
+          <p:cNvSpPr/>
+          <p:nvPr/>
+        </p:nvSpPr>
+        <p:spPr>
+          <a:xfrm rot="17307091">
+            <a:off x="4517126" y="5278685"/>
+            <a:ext cx="445930" cy="369332"/>
+          </a:xfrm>
+          <a:prstGeom prst="rect">
+            <a:avLst/>
+          </a:prstGeom>
+        </p:spPr>
+        <p:txBody>
+          <a:bodyPr wrap="none">
+            <a:spAutoFit/>
+          </a:bodyPr>
+          <a:lstStyle/>
+          <a:p>
+            <a:r>
+              <a:rPr lang="en-US" dirty="0"/>
+              <a:t>(b) </a:t>
+            </a:r>
+          </a:p>
+        </p:txBody>
+      </p:sp>
+      <p:sp>
+        <p:nvSpPr>
+          <p:cNvPr id="16" name="Rectangle 15"/>
+          <p:cNvSpPr/>
+          <p:nvPr/>
+        </p:nvSpPr>
+        <p:spPr>
+          <a:xfrm rot="4260021">
+            <a:off x="7061463" y="5340874"/>
+            <a:ext cx="422261" cy="369332"/>
+          </a:xfrm>
+          <a:prstGeom prst="rect">
+            <a:avLst/>
+          </a:prstGeom>
+        </p:spPr>
+        <p:txBody>
+          <a:bodyPr wrap="none">
+            <a:spAutoFit/>
+          </a:bodyPr>
+          <a:lstStyle/>
+          <a:p>
+            <a:r>
+              <a:rPr lang="en-US" dirty="0"/>
+              <a:t>(c) </a:t>
+            </a:r>
+          </a:p>
+        </p:txBody>
+      </p:sp>
+      <p:sp>
+        <p:nvSpPr>
+          <p:cNvPr id="25" name="Rectangle 24"/>
+          <p:cNvSpPr/>
+          <p:nvPr/>
+        </p:nvSpPr>
+        <p:spPr>
+          <a:xfrm rot="17317666">
+            <a:off x="4809696" y="5205587"/>
+            <a:ext cx="445930" cy="369332"/>
+          </a:xfrm>
+          <a:prstGeom prst="rect">
+            <a:avLst/>
+          </a:prstGeom>
+        </p:spPr>
+        <p:txBody>
+          <a:bodyPr wrap="none">
+            <a:spAutoFit/>
+          </a:bodyPr>
+          <a:lstStyle/>
+          <a:p>
+            <a:r>
+              <a:rPr lang="en-US" dirty="0" smtClean="0"/>
+              <a:t>(b) </a:t>
+            </a:r>
+            <a:endParaRPr lang="en-US" dirty="0"/>
+          </a:p>
+        </p:txBody>
+      </p:sp>
+      <p:sp>
+        <p:nvSpPr>
+          <p:cNvPr id="26" name="Rectangle 25"/>
+          <p:cNvSpPr/>
+          <p:nvPr/>
+        </p:nvSpPr>
+        <p:spPr>
+          <a:xfrm rot="4292969">
+            <a:off x="7302544" y="5219523"/>
+            <a:ext cx="422261" cy="369332"/>
+          </a:xfrm>
+          <a:prstGeom prst="rect">
+            <a:avLst/>
+          </a:prstGeom>
+        </p:spPr>
+        <p:txBody>
+          <a:bodyPr wrap="none">
+            <a:spAutoFit/>
+          </a:bodyPr>
+          <a:lstStyle/>
+          <a:p>
+            <a:r>
+              <a:rPr lang="en-US" dirty="0" smtClean="0"/>
+              <a:t>(c) </a:t>
+            </a:r>
+            <a:endParaRPr lang="en-US" dirty="0"/>
+          </a:p>
+        </p:txBody>
+      </p:sp>
+      <p:sp>
+        <p:nvSpPr>
+          <p:cNvPr id="29" name="TextBox 28"/>
+          <p:cNvSpPr txBox="1"/>
+          <p:nvPr/>
+        </p:nvSpPr>
+        <p:spPr>
+          <a:xfrm rot="16200000">
+            <a:off x="3263439" y="1379322"/>
+            <a:ext cx="1838188" cy="523220"/>
+          </a:xfrm>
+          <a:prstGeom prst="rect">
+            <a:avLst/>
+          </a:prstGeom>
+          <a:solidFill>
+            <a:srgbClr val="FFFFFF"/>
+          </a:solidFill>
+        </p:spPr>
+        <p:txBody>
+          <a:bodyPr wrap="none" rtlCol="0">
+            <a:spAutoFit/>
+          </a:bodyPr>
+          <a:lstStyle/>
+          <a:p>
+            <a:r>
+              <a:rPr lang="en-US" sz="2800" dirty="0" smtClean="0"/>
+              <a:t>Abundance</a:t>
+            </a:r>
+            <a:endParaRPr lang="en-US" sz="2800" dirty="0"/>
+          </a:p>
+        </p:txBody>
+      </p:sp>
+      <p:grpSp>
+        <p:nvGrpSpPr>
+          <p:cNvPr id="4" name="Group 3"/>
+          <p:cNvGrpSpPr/>
+          <p:nvPr/>
+        </p:nvGrpSpPr>
+        <p:grpSpPr>
+          <a:xfrm>
+            <a:off x="-577333" y="-1841345"/>
+            <a:ext cx="8702219" cy="8454807"/>
+            <a:chOff x="-329340" y="-409223"/>
+            <a:chExt cx="8702219" cy="8454807"/>
+          </a:xfrm>
+        </p:grpSpPr>
+        <p:grpSp>
+          <p:nvGrpSpPr>
+            <p:cNvPr id="23" name="Group 22"/>
+            <p:cNvGrpSpPr/>
+            <p:nvPr/>
+          </p:nvGrpSpPr>
+          <p:grpSpPr>
+            <a:xfrm>
+              <a:off x="-329340" y="-409223"/>
+              <a:ext cx="8702219" cy="8454807"/>
+              <a:chOff x="-316640" y="-409223"/>
+              <a:chExt cx="8702219" cy="8454807"/>
+            </a:xfrm>
+          </p:grpSpPr>
+          <p:pic>
+            <p:nvPicPr>
+              <p:cNvPr id="5" name="Picture 4"/>
+              <p:cNvPicPr>
+                <a:picLocks noChangeAspect="1"/>
+              </p:cNvPicPr>
+              <p:nvPr/>
+            </p:nvPicPr>
+            <p:blipFill rotWithShape="1">
+              <a:blip r:embed="rId3"/>
+              <a:srcRect l="6560"/>
+              <a:stretch/>
+            </p:blipFill>
+            <p:spPr>
+              <a:xfrm>
+                <a:off x="4271433" y="3595504"/>
+                <a:ext cx="4077940" cy="4450080"/>
+              </a:xfrm>
+              <a:prstGeom prst="rect">
+                <a:avLst/>
+              </a:prstGeom>
+              <a:solidFill>
+                <a:srgbClr val="FFFFFF"/>
+              </a:solidFill>
+            </p:spPr>
+          </p:pic>
+          <p:grpSp>
+            <p:nvGrpSpPr>
+              <p:cNvPr id="22" name="Group 21"/>
+              <p:cNvGrpSpPr/>
+              <p:nvPr/>
+            </p:nvGrpSpPr>
+            <p:grpSpPr>
+              <a:xfrm>
+                <a:off x="-316640" y="-409223"/>
+                <a:ext cx="8702219" cy="8161490"/>
+                <a:chOff x="-316640" y="-409223"/>
+                <a:chExt cx="8702219" cy="8161490"/>
+              </a:xfrm>
+            </p:grpSpPr>
+            <p:pic>
+              <p:nvPicPr>
+                <p:cNvPr id="6" name="Picture 5"/>
+                <p:cNvPicPr>
+                  <a:picLocks noChangeAspect="1"/>
+                </p:cNvPicPr>
+                <p:nvPr/>
+              </p:nvPicPr>
+              <p:blipFill rotWithShape="1">
+                <a:blip r:embed="rId4"/>
+                <a:srcRect t="9177"/>
+                <a:stretch/>
+              </p:blipFill>
+              <p:spPr>
+                <a:xfrm>
+                  <a:off x="-232832" y="0"/>
+                  <a:ext cx="4373058" cy="4049888"/>
+                </a:xfrm>
+                <a:prstGeom prst="rect">
+                  <a:avLst/>
+                </a:prstGeom>
+                <a:solidFill>
+                  <a:srgbClr val="FFFFFF"/>
+                </a:solidFill>
+              </p:spPr>
+            </p:pic>
+            <p:cxnSp>
+              <p:nvCxnSpPr>
+                <p:cNvPr id="7" name="Straight Connector 6"/>
+                <p:cNvCxnSpPr/>
+                <p:nvPr/>
+              </p:nvCxnSpPr>
+              <p:spPr>
+                <a:xfrm>
+                  <a:off x="6297326" y="4085396"/>
+                  <a:ext cx="0" cy="3399137"/>
+                </a:xfrm>
+                <a:prstGeom prst="line">
+                  <a:avLst/>
+                </a:prstGeom>
+                <a:ln>
+                  <a:solidFill>
+                    <a:schemeClr val="tx1"/>
+                  </a:solidFill>
+                  <a:prstDash val="dash"/>
+                </a:ln>
+              </p:spPr>
+              <p:style>
+                <a:lnRef idx="2">
+                  <a:schemeClr val="accent1"/>
+                </a:lnRef>
+                <a:fillRef idx="0">
+                  <a:schemeClr val="accent1"/>
+                </a:fillRef>
+                <a:effectRef idx="1">
+                  <a:schemeClr val="accent1"/>
+                </a:effectRef>
+                <a:fontRef idx="minor">
+                  <a:schemeClr val="tx1"/>
+                </a:fontRef>
+              </p:style>
+            </p:cxnSp>
+            <p:sp>
+              <p:nvSpPr>
+                <p:cNvPr id="8" name="TextBox 7"/>
+                <p:cNvSpPr txBox="1"/>
+                <p:nvPr/>
+              </p:nvSpPr>
+              <p:spPr>
+                <a:xfrm>
+                  <a:off x="6160863" y="7382935"/>
+                  <a:ext cx="301660" cy="369332"/>
+                </a:xfrm>
+                <a:prstGeom prst="rect">
+                  <a:avLst/>
+                </a:prstGeom>
+                <a:noFill/>
+              </p:spPr>
+              <p:txBody>
+                <a:bodyPr wrap="none" rtlCol="0">
+                  <a:spAutoFit/>
+                </a:bodyPr>
+                <a:lstStyle/>
+                <a:p>
+                  <a:r>
+                    <a:rPr lang="en-US" dirty="0" smtClean="0"/>
+                    <a:t>0</a:t>
+                  </a:r>
+                  <a:endParaRPr lang="en-US" dirty="0"/>
+                </a:p>
+              </p:txBody>
+            </p:sp>
+            <p:sp>
+              <p:nvSpPr>
+                <p:cNvPr id="9" name="TextBox 8"/>
+                <p:cNvSpPr txBox="1"/>
+                <p:nvPr/>
+              </p:nvSpPr>
+              <p:spPr>
+                <a:xfrm>
+                  <a:off x="5805201" y="4084336"/>
+                  <a:ext cx="942820" cy="430887"/>
+                </a:xfrm>
+                <a:prstGeom prst="rect">
+                  <a:avLst/>
+                </a:prstGeom>
+                <a:solidFill>
+                  <a:schemeClr val="tx2">
+                    <a:lumMod val="40000"/>
+                    <a:lumOff val="60000"/>
+                  </a:schemeClr>
+                </a:solidFill>
+                <a:ln>
+                  <a:solidFill>
+                    <a:schemeClr val="tx1"/>
+                  </a:solidFill>
+                  <a:prstDash val="solid"/>
+                </a:ln>
+              </p:spPr>
+              <p:txBody>
+                <a:bodyPr wrap="square" rtlCol="0">
+                  <a:spAutoFit/>
+                </a:bodyPr>
+                <a:lstStyle/>
+                <a:p>
+                  <a:pPr algn="ctr"/>
+                  <a:r>
+                    <a:rPr lang="en-US" sz="2200" b="1" dirty="0" smtClean="0"/>
+                    <a:t>match</a:t>
+                  </a:r>
+                  <a:endParaRPr lang="en-US" sz="2200" b="1" dirty="0"/>
+                </a:p>
+              </p:txBody>
+            </p:sp>
+            <p:sp>
+              <p:nvSpPr>
+                <p:cNvPr id="10" name="TextBox 9"/>
+                <p:cNvSpPr txBox="1"/>
+                <p:nvPr/>
+              </p:nvSpPr>
+              <p:spPr>
+                <a:xfrm rot="4253040">
+                  <a:off x="6506386" y="5449077"/>
+                  <a:ext cx="1332053" cy="430887"/>
+                </a:xfrm>
+                <a:prstGeom prst="rect">
+                  <a:avLst/>
+                </a:prstGeom>
+                <a:solidFill>
+                  <a:srgbClr val="FF0000">
+                    <a:alpha val="77000"/>
+                  </a:srgbClr>
+                </a:solidFill>
+                <a:ln>
+                  <a:solidFill>
+                    <a:schemeClr val="tx1"/>
+                  </a:solidFill>
+                </a:ln>
+              </p:spPr>
+              <p:txBody>
+                <a:bodyPr wrap="none" rtlCol="0">
+                  <a:spAutoFit/>
+                </a:bodyPr>
+                <a:lstStyle/>
+                <a:p>
+                  <a:r>
+                    <a:rPr lang="en-US" sz="2200" b="1" dirty="0" smtClean="0"/>
+                    <a:t>mismatch</a:t>
+                  </a:r>
+                  <a:endParaRPr lang="en-US" sz="2200" b="1" dirty="0"/>
+                </a:p>
+              </p:txBody>
+            </p:sp>
+            <p:sp>
+              <p:nvSpPr>
+                <p:cNvPr id="11" name="Right Arrow 10"/>
+                <p:cNvSpPr/>
+                <p:nvPr/>
+              </p:nvSpPr>
+              <p:spPr>
+                <a:xfrm rot="3973453">
+                  <a:off x="6559804" y="4610704"/>
+                  <a:ext cx="537208" cy="375539"/>
+                </a:xfrm>
+                <a:prstGeom prst="rightArrow">
+                  <a:avLst/>
+                </a:prstGeom>
+                <a:solidFill>
+                  <a:srgbClr val="D9D9D9"/>
+                </a:solidFill>
+                <a:ln>
+                  <a:solidFill>
+                    <a:schemeClr val="tx1"/>
+                  </a:solidFill>
+                </a:ln>
+                <a:effectLst/>
+              </p:spPr>
+              <p:style>
+                <a:lnRef idx="1">
+                  <a:schemeClr val="accent1"/>
+                </a:lnRef>
+                <a:fillRef idx="3">
+                  <a:schemeClr val="accent1"/>
+                </a:fillRef>
+                <a:effectRef idx="2">
+                  <a:schemeClr val="accent1"/>
+                </a:effectRef>
+                <a:fontRef idx="minor">
+                  <a:schemeClr val="lt1"/>
+                </a:fontRef>
+              </p:style>
+              <p:txBody>
+                <a:bodyPr rtlCol="0" anchor="ctr"/>
+                <a:lstStyle/>
+                <a:p>
+                  <a:pPr algn="ctr"/>
+                  <a:endParaRPr lang="en-US"/>
+                </a:p>
+              </p:txBody>
+            </p:sp>
+            <p:sp>
+              <p:nvSpPr>
+                <p:cNvPr id="12" name="TextBox 11"/>
+                <p:cNvSpPr txBox="1"/>
+                <p:nvPr/>
+              </p:nvSpPr>
+              <p:spPr>
+                <a:xfrm rot="17332499">
+                  <a:off x="4723797" y="5440594"/>
+                  <a:ext cx="1332053" cy="430887"/>
+                </a:xfrm>
+                <a:prstGeom prst="rect">
+                  <a:avLst/>
+                </a:prstGeom>
+                <a:solidFill>
+                  <a:srgbClr val="FF0000">
+                    <a:alpha val="77000"/>
+                  </a:srgbClr>
+                </a:solidFill>
+                <a:ln>
+                  <a:solidFill>
+                    <a:schemeClr val="tx1"/>
+                  </a:solidFill>
+                </a:ln>
+              </p:spPr>
+              <p:txBody>
+                <a:bodyPr wrap="none" rtlCol="0">
+                  <a:spAutoFit/>
+                </a:bodyPr>
+                <a:lstStyle/>
+                <a:p>
+                  <a:r>
+                    <a:rPr lang="en-US" sz="2200" b="1" dirty="0" smtClean="0"/>
+                    <a:t>mismatch</a:t>
+                  </a:r>
+                  <a:endParaRPr lang="en-US" sz="2200" b="1" dirty="0"/>
+                </a:p>
+              </p:txBody>
+            </p:sp>
+            <p:sp>
+              <p:nvSpPr>
+                <p:cNvPr id="13" name="Right Arrow 12"/>
+                <p:cNvSpPr/>
+                <p:nvPr/>
+              </p:nvSpPr>
+              <p:spPr>
+                <a:xfrm rot="6985390">
+                  <a:off x="5453672" y="4604345"/>
+                  <a:ext cx="537208" cy="375539"/>
+                </a:xfrm>
+                <a:prstGeom prst="rightArrow">
+                  <a:avLst/>
+                </a:prstGeom>
+                <a:solidFill>
+                  <a:srgbClr val="D9D9D9"/>
+                </a:solidFill>
+                <a:ln>
+                  <a:solidFill>
+                    <a:schemeClr val="tx1"/>
+                  </a:solidFill>
+                </a:ln>
+                <a:effectLst/>
+              </p:spPr>
+              <p:style>
+                <a:lnRef idx="1">
+                  <a:schemeClr val="accent1"/>
+                </a:lnRef>
+                <a:fillRef idx="3">
+                  <a:schemeClr val="accent1"/>
+                </a:fillRef>
+                <a:effectRef idx="2">
+                  <a:schemeClr val="accent1"/>
+                </a:effectRef>
+                <a:fontRef idx="minor">
+                  <a:schemeClr val="lt1"/>
+                </a:fontRef>
+              </p:style>
+              <p:txBody>
+                <a:bodyPr rtlCol="0" anchor="ctr"/>
+                <a:lstStyle/>
+                <a:p>
+                  <a:pPr algn="ctr"/>
+                  <a:endParaRPr lang="en-US"/>
+                </a:p>
+              </p:txBody>
+            </p:sp>
+            <p:pic>
+              <p:nvPicPr>
+                <p:cNvPr id="3" name="Picture 2"/>
+                <p:cNvPicPr>
+                  <a:picLocks noChangeAspect="1"/>
+                </p:cNvPicPr>
+                <p:nvPr/>
+              </p:nvPicPr>
+              <p:blipFill rotWithShape="1">
+                <a:blip r:embed="rId5"/>
+                <a:srcRect l="6269" b="1127"/>
+                <a:stretch/>
+              </p:blipFill>
+              <p:spPr>
+                <a:xfrm>
+                  <a:off x="4271433" y="-409223"/>
+                  <a:ext cx="4114146" cy="4425244"/>
+                </a:xfrm>
+                <a:prstGeom prst="rect">
+                  <a:avLst/>
+                </a:prstGeom>
+              </p:spPr>
+            </p:pic>
+            <p:sp>
+              <p:nvSpPr>
+                <p:cNvPr id="14" name="TextBox 13"/>
+                <p:cNvSpPr txBox="1"/>
+                <p:nvPr/>
+              </p:nvSpPr>
+              <p:spPr>
+                <a:xfrm>
+                  <a:off x="243143" y="79601"/>
+                  <a:ext cx="405354" cy="430887"/>
+                </a:xfrm>
+                <a:prstGeom prst="rect">
+                  <a:avLst/>
+                </a:prstGeom>
+                <a:solidFill>
+                  <a:srgbClr val="FFFFFF"/>
+                </a:solidFill>
+                <a:ln>
+                  <a:noFill/>
+                  <a:prstDash val="solid"/>
+                </a:ln>
+              </p:spPr>
+              <p:txBody>
+                <a:bodyPr wrap="none" rtlCol="0">
+                  <a:spAutoFit/>
+                </a:bodyPr>
+                <a:lstStyle/>
+                <a:p>
+                  <a:r>
+                    <a:rPr lang="en-US" sz="2200" dirty="0" smtClean="0"/>
+                    <a:t>a)</a:t>
+                  </a:r>
+                  <a:endParaRPr lang="en-US" sz="2200" dirty="0"/>
+                </a:p>
+              </p:txBody>
+            </p:sp>
+            <p:sp>
+              <p:nvSpPr>
+                <p:cNvPr id="15" name="TextBox 14"/>
+                <p:cNvSpPr txBox="1"/>
+                <p:nvPr/>
+              </p:nvSpPr>
+              <p:spPr>
+                <a:xfrm>
+                  <a:off x="4490984" y="79601"/>
+                  <a:ext cx="418441" cy="430887"/>
+                </a:xfrm>
+                <a:prstGeom prst="rect">
+                  <a:avLst/>
+                </a:prstGeom>
+                <a:solidFill>
+                  <a:srgbClr val="FFFFFF"/>
+                </a:solidFill>
+                <a:ln>
+                  <a:noFill/>
+                  <a:prstDash val="solid"/>
+                </a:ln>
+              </p:spPr>
+              <p:txBody>
+                <a:bodyPr wrap="none" rtlCol="0">
+                  <a:spAutoFit/>
+                </a:bodyPr>
+                <a:lstStyle/>
+                <a:p>
+                  <a:r>
+                    <a:rPr lang="en-US" sz="2200" dirty="0"/>
+                    <a:t>b</a:t>
+                  </a:r>
+                  <a:r>
+                    <a:rPr lang="en-US" sz="2200" dirty="0" smtClean="0"/>
+                    <a:t>)</a:t>
+                  </a:r>
+                  <a:endParaRPr lang="en-US" sz="2200" dirty="0"/>
+                </a:p>
+              </p:txBody>
+            </p:sp>
+            <p:sp>
+              <p:nvSpPr>
+                <p:cNvPr id="18" name="TextBox 17"/>
+                <p:cNvSpPr txBox="1"/>
+                <p:nvPr/>
+              </p:nvSpPr>
+              <p:spPr>
+                <a:xfrm>
+                  <a:off x="209277" y="4085396"/>
+                  <a:ext cx="389512" cy="430887"/>
+                </a:xfrm>
+                <a:prstGeom prst="rect">
+                  <a:avLst/>
+                </a:prstGeom>
+                <a:solidFill>
+                  <a:srgbClr val="FFFFFF"/>
+                </a:solidFill>
+                <a:ln>
+                  <a:noFill/>
+                  <a:prstDash val="solid"/>
+                </a:ln>
+              </p:spPr>
+              <p:txBody>
+                <a:bodyPr wrap="none" rtlCol="0">
+                  <a:spAutoFit/>
+                </a:bodyPr>
+                <a:lstStyle/>
+                <a:p>
+                  <a:r>
+                    <a:rPr lang="en-US" sz="2200" dirty="0" smtClean="0"/>
+                    <a:t>c)</a:t>
+                  </a:r>
+                  <a:endParaRPr lang="en-US" sz="2200" dirty="0"/>
+                </a:p>
+              </p:txBody>
+            </p:sp>
+            <p:sp>
+              <p:nvSpPr>
+                <p:cNvPr id="19" name="TextBox 18"/>
+                <p:cNvSpPr txBox="1"/>
+                <p:nvPr/>
+              </p:nvSpPr>
+              <p:spPr>
+                <a:xfrm>
+                  <a:off x="4474916" y="4085396"/>
+                  <a:ext cx="418441" cy="430887"/>
+                </a:xfrm>
+                <a:prstGeom prst="rect">
+                  <a:avLst/>
+                </a:prstGeom>
+                <a:solidFill>
+                  <a:srgbClr val="FFFFFF"/>
+                </a:solidFill>
+                <a:ln>
+                  <a:noFill/>
+                  <a:prstDash val="solid"/>
+                </a:ln>
+              </p:spPr>
+              <p:txBody>
+                <a:bodyPr wrap="none" rtlCol="0">
+                  <a:spAutoFit/>
+                </a:bodyPr>
+                <a:lstStyle/>
+                <a:p>
+                  <a:r>
+                    <a:rPr lang="en-US" sz="2200" dirty="0"/>
+                    <a:t>d</a:t>
+                  </a:r>
+                  <a:r>
+                    <a:rPr lang="en-US" sz="2200" dirty="0" smtClean="0"/>
+                    <a:t>)</a:t>
+                  </a:r>
+                  <a:endParaRPr lang="en-US" sz="2200" dirty="0"/>
+                </a:p>
+              </p:txBody>
+            </p:sp>
+            <p:sp>
+              <p:nvSpPr>
+                <p:cNvPr id="20" name="TextBox 19"/>
+                <p:cNvSpPr txBox="1"/>
+                <p:nvPr/>
+              </p:nvSpPr>
+              <p:spPr>
+                <a:xfrm rot="16200000">
+                  <a:off x="-974124" y="1379323"/>
+                  <a:ext cx="1838188" cy="523220"/>
+                </a:xfrm>
+                <a:prstGeom prst="rect">
+                  <a:avLst/>
+                </a:prstGeom>
+                <a:solidFill>
+                  <a:srgbClr val="FFFFFF"/>
+                </a:solidFill>
+              </p:spPr>
+              <p:txBody>
+                <a:bodyPr wrap="none" rtlCol="0">
+                  <a:spAutoFit/>
+                </a:bodyPr>
+                <a:lstStyle/>
+                <a:p>
+                  <a:r>
+                    <a:rPr lang="en-US" sz="2800" dirty="0" smtClean="0"/>
+                    <a:t>Abundance</a:t>
+                  </a:r>
+                  <a:endParaRPr lang="en-US" sz="2800" dirty="0"/>
+                </a:p>
+              </p:txBody>
+            </p:sp>
+          </p:grpSp>
+        </p:grpSp>
+        <p:sp>
+          <p:nvSpPr>
+            <p:cNvPr id="17" name="Rectangle 16"/>
+            <p:cNvSpPr/>
+            <p:nvPr/>
+          </p:nvSpPr>
+          <p:spPr>
+            <a:xfrm>
+              <a:off x="5396773" y="4107633"/>
+              <a:ext cx="435223" cy="369332"/>
+            </a:xfrm>
+            <a:prstGeom prst="rect">
+              <a:avLst/>
+            </a:prstGeom>
+          </p:spPr>
+          <p:txBody>
+            <a:bodyPr wrap="none">
+              <a:spAutoFit/>
+            </a:bodyPr>
+            <a:lstStyle/>
+            <a:p>
+              <a:r>
+                <a:rPr lang="en-US" dirty="0"/>
+                <a:t>(a) </a:t>
+              </a:r>
+            </a:p>
+          </p:txBody>
+        </p:sp>
+        <p:sp>
+          <p:nvSpPr>
+            <p:cNvPr id="28" name="TextBox 27"/>
+            <p:cNvSpPr txBox="1"/>
+            <p:nvPr/>
+          </p:nvSpPr>
+          <p:spPr>
+            <a:xfrm rot="16200000">
+              <a:off x="3554062" y="5468514"/>
+              <a:ext cx="1200519" cy="523220"/>
+            </a:xfrm>
+            <a:prstGeom prst="rect">
+              <a:avLst/>
+            </a:prstGeom>
+            <a:solidFill>
+              <a:srgbClr val="FFFFFF"/>
+            </a:solidFill>
+          </p:spPr>
+          <p:txBody>
+            <a:bodyPr wrap="none" rtlCol="0">
+              <a:spAutoFit/>
+            </a:bodyPr>
+            <a:lstStyle/>
+            <a:p>
+              <a:r>
+                <a:rPr lang="en-US" sz="2800" dirty="0" smtClean="0"/>
+                <a:t>Fitness</a:t>
+              </a:r>
+              <a:endParaRPr lang="en-US" sz="2800" dirty="0"/>
+            </a:p>
+          </p:txBody>
+        </p:sp>
+        <p:sp>
+          <p:nvSpPr>
+            <p:cNvPr id="31" name="Rectangle 30"/>
+            <p:cNvSpPr/>
+            <p:nvPr/>
+          </p:nvSpPr>
+          <p:spPr>
+            <a:xfrm rot="17276937">
+              <a:off x="4787497" y="5261448"/>
+              <a:ext cx="445930" cy="369332"/>
+            </a:xfrm>
+            <a:prstGeom prst="rect">
+              <a:avLst/>
+            </a:prstGeom>
+          </p:spPr>
+          <p:txBody>
+            <a:bodyPr wrap="none">
+              <a:spAutoFit/>
+            </a:bodyPr>
+            <a:lstStyle/>
+            <a:p>
+              <a:r>
+                <a:rPr lang="en-US" dirty="0" smtClean="0"/>
+                <a:t>(b) </a:t>
+              </a:r>
+              <a:endParaRPr lang="en-US" dirty="0"/>
+            </a:p>
+          </p:txBody>
+        </p:sp>
+        <p:sp>
+          <p:nvSpPr>
+            <p:cNvPr id="32" name="Rectangle 31"/>
+            <p:cNvSpPr/>
+            <p:nvPr/>
+          </p:nvSpPr>
+          <p:spPr>
+            <a:xfrm rot="4181040">
+              <a:off x="7292104" y="5192099"/>
+              <a:ext cx="422261" cy="369332"/>
+            </a:xfrm>
+            <a:prstGeom prst="rect">
+              <a:avLst/>
+            </a:prstGeom>
+          </p:spPr>
+          <p:txBody>
+            <a:bodyPr wrap="none">
+              <a:spAutoFit/>
+            </a:bodyPr>
+            <a:lstStyle/>
+            <a:p>
+              <a:r>
+                <a:rPr lang="en-US" dirty="0" smtClean="0"/>
+                <a:t>(c) </a:t>
+              </a:r>
+              <a:endParaRPr lang="en-US" dirty="0"/>
+            </a:p>
+          </p:txBody>
+        </p:sp>
+      </p:grpSp>
+      <p:pic>
+        <p:nvPicPr>
+          <p:cNvPr id="34" name="Picture 33"/>
+          <p:cNvPicPr>
+            <a:picLocks noChangeAspect="1"/>
+          </p:cNvPicPr>
+          <p:nvPr/>
+        </p:nvPicPr>
+        <p:blipFill rotWithShape="1">
+          <a:blip r:embed="rId6"/>
+          <a:srcRect r="4706"/>
+          <a:stretch/>
+        </p:blipFill>
+        <p:spPr>
+          <a:xfrm>
+            <a:off x="-600269" y="3456482"/>
+            <a:ext cx="4538125" cy="4732566"/>
+          </a:xfrm>
+          <a:prstGeom prst="rect">
+            <a:avLst/>
+          </a:prstGeom>
+          <a:solidFill>
+            <a:schemeClr val="bg1"/>
+          </a:solidFill>
+        </p:spPr>
+      </p:pic>
+      <p:cxnSp>
+        <p:nvCxnSpPr>
+          <p:cNvPr id="36" name="Straight Connector 35"/>
+          <p:cNvCxnSpPr>
+            <a:endCxn id="38" idx="0"/>
+          </p:cNvCxnSpPr>
+          <p:nvPr/>
+        </p:nvCxnSpPr>
+        <p:spPr>
+          <a:xfrm flipH="1">
+            <a:off x="1913468" y="4271662"/>
+            <a:ext cx="2360" cy="1961712"/>
+          </a:xfrm>
+          <a:prstGeom prst="line">
+            <a:avLst/>
+          </a:prstGeom>
+          <a:ln>
+            <a:solidFill>
+              <a:schemeClr val="tx1"/>
+            </a:solidFill>
+            <a:prstDash val="dash"/>
+          </a:ln>
+        </p:spPr>
+        <p:style>
+          <a:lnRef idx="2">
+            <a:schemeClr val="accent1"/>
+          </a:lnRef>
+          <a:fillRef idx="0">
+            <a:schemeClr val="accent1"/>
+          </a:fillRef>
+          <a:effectRef idx="1">
+            <a:schemeClr val="accent1"/>
+          </a:effectRef>
+          <a:fontRef idx="minor">
+            <a:schemeClr val="tx1"/>
+          </a:fontRef>
+        </p:style>
+      </p:cxnSp>
+      <p:sp>
+        <p:nvSpPr>
+          <p:cNvPr id="35" name="TextBox 34"/>
+          <p:cNvSpPr txBox="1"/>
+          <p:nvPr/>
+        </p:nvSpPr>
+        <p:spPr>
+          <a:xfrm>
+            <a:off x="1355969" y="4066820"/>
+            <a:ext cx="1200966" cy="430887"/>
+          </a:xfrm>
+          <a:prstGeom prst="rect">
+            <a:avLst/>
+          </a:prstGeom>
+          <a:solidFill>
+            <a:schemeClr val="tx2">
+              <a:lumMod val="40000"/>
+              <a:lumOff val="60000"/>
+            </a:schemeClr>
+          </a:solidFill>
+          <a:ln>
+            <a:solidFill>
+              <a:schemeClr val="tx1"/>
+            </a:solidFill>
+            <a:prstDash val="solid"/>
+          </a:ln>
+        </p:spPr>
+        <p:txBody>
+          <a:bodyPr wrap="square" rtlCol="0">
+            <a:spAutoFit/>
+          </a:bodyPr>
+          <a:lstStyle/>
+          <a:p>
+            <a:pPr algn="ctr"/>
+            <a:r>
+              <a:rPr lang="en-US" sz="2200" b="1" dirty="0" smtClean="0"/>
+              <a:t>baseline</a:t>
+            </a:r>
+            <a:endParaRPr lang="en-US" sz="2200" b="1" dirty="0"/>
+          </a:p>
+        </p:txBody>
+      </p:sp>
+      <p:sp>
+        <p:nvSpPr>
+          <p:cNvPr id="37" name="TextBox 36"/>
+          <p:cNvSpPr txBox="1"/>
+          <p:nvPr/>
+        </p:nvSpPr>
+        <p:spPr>
+          <a:xfrm>
+            <a:off x="1813230" y="7366005"/>
+            <a:ext cx="301660" cy="369332"/>
+          </a:xfrm>
+          <a:prstGeom prst="rect">
+            <a:avLst/>
+          </a:prstGeom>
+          <a:noFill/>
+        </p:spPr>
+        <p:txBody>
+          <a:bodyPr wrap="none" rtlCol="0">
+            <a:spAutoFit/>
+          </a:bodyPr>
+          <a:lstStyle/>
+          <a:p>
+            <a:r>
+              <a:rPr lang="en-US" dirty="0" smtClean="0"/>
+              <a:t>0</a:t>
+            </a:r>
+            <a:endParaRPr lang="en-US" dirty="0"/>
+          </a:p>
+        </p:txBody>
+      </p:sp>
+      <p:sp>
+        <p:nvSpPr>
+          <p:cNvPr id="38" name="Rectangle 37"/>
+          <p:cNvSpPr/>
+          <p:nvPr/>
+        </p:nvSpPr>
+        <p:spPr>
+          <a:xfrm>
+            <a:off x="1032934" y="6233374"/>
+            <a:ext cx="1761067" cy="569204"/>
+          </a:xfrm>
+          <a:prstGeom prst="rect">
+            <a:avLst/>
+          </a:prstGeom>
+          <a:noFill/>
+          <a:ln w="38100" cmpd="sng">
+            <a:solidFill>
+              <a:srgbClr val="FF0000"/>
+            </a:solidFill>
+            <a:prstDash val="solid"/>
+          </a:ln>
+          <a:effectLst/>
+        </p:spPr>
+        <p:style>
+          <a:lnRef idx="1">
+            <a:schemeClr val="accent1"/>
+          </a:lnRef>
+          <a:fillRef idx="3">
+            <a:schemeClr val="accent1"/>
+          </a:fillRef>
+          <a:effectRef idx="2">
+            <a:schemeClr val="accent1"/>
+          </a:effectRef>
+          <a:fontRef idx="minor">
+            <a:schemeClr val="lt1"/>
+          </a:fontRef>
+        </p:style>
+        <p:txBody>
+          <a:bodyPr rtlCol="0" anchor="ctr"/>
+          <a:lstStyle/>
+          <a:p>
+            <a:pPr algn="ctr"/>
+            <a:endParaRPr lang="en-US"/>
+          </a:p>
+        </p:txBody>
+      </p:sp>
+      <p:sp>
+        <p:nvSpPr>
+          <p:cNvPr id="39" name="Rectangle 38"/>
+          <p:cNvSpPr/>
+          <p:nvPr/>
+        </p:nvSpPr>
+        <p:spPr>
+          <a:xfrm>
+            <a:off x="1393419" y="6182575"/>
+            <a:ext cx="1161922" cy="430887"/>
+          </a:xfrm>
+          <a:prstGeom prst="rect">
+            <a:avLst/>
+          </a:prstGeom>
+        </p:spPr>
+        <p:txBody>
+          <a:bodyPr wrap="none">
+            <a:spAutoFit/>
+          </a:bodyPr>
+          <a:lstStyle/>
+          <a:p>
+            <a:r>
+              <a:rPr lang="en-US" sz="2200" b="1" dirty="0">
+                <a:solidFill>
+                  <a:srgbClr val="FF0000"/>
+                </a:solidFill>
+              </a:rPr>
+              <a:t>b</a:t>
+            </a:r>
+            <a:r>
+              <a:rPr lang="en-US" sz="2200" b="1" dirty="0" smtClean="0">
+                <a:solidFill>
+                  <a:srgbClr val="FF0000"/>
+                </a:solidFill>
+              </a:rPr>
+              <a:t>aseline</a:t>
+            </a:r>
+            <a:endParaRPr lang="en-US" sz="2200" b="1" dirty="0">
+              <a:solidFill>
+                <a:srgbClr val="FF0000"/>
+              </a:solidFill>
+            </a:endParaRPr>
+          </a:p>
+        </p:txBody>
+      </p:sp>
+      <p:cxnSp>
+        <p:nvCxnSpPr>
+          <p:cNvPr id="40" name="Straight Connector 39"/>
+          <p:cNvCxnSpPr/>
+          <p:nvPr/>
+        </p:nvCxnSpPr>
+        <p:spPr>
+          <a:xfrm flipH="1">
+            <a:off x="1947334" y="6794727"/>
+            <a:ext cx="4718" cy="689806"/>
+          </a:xfrm>
+          <a:prstGeom prst="line">
+            <a:avLst/>
+          </a:prstGeom>
+          <a:ln>
+            <a:solidFill>
+              <a:schemeClr val="tx1"/>
+            </a:solidFill>
+            <a:prstDash val="dash"/>
+          </a:ln>
+        </p:spPr>
+        <p:style>
+          <a:lnRef idx="2">
+            <a:schemeClr val="accent1"/>
+          </a:lnRef>
+          <a:fillRef idx="0">
+            <a:schemeClr val="accent1"/>
+          </a:fillRef>
+          <a:effectRef idx="1">
+            <a:schemeClr val="accent1"/>
+          </a:effectRef>
+          <a:fontRef idx="minor">
+            <a:schemeClr val="tx1"/>
+          </a:fontRef>
+        </p:style>
+      </p:cxnSp>
+    </p:spTree>
+    <p:extLst>
+      <p:ext uri="{BB962C8B-B14F-4D97-AF65-F5344CB8AC3E}">
+        <p14:creationId xmlns:p14="http://schemas.microsoft.com/office/powerpoint/2010/main" val="2496440080"/>
+      </p:ext>
+    </p:extLst>
+  </p:cSld>
+  <p:clrMapOvr>
+    <a:masterClrMapping/>
+  </p:clrMapOvr>
+</p:sld>
+</file>
+
+<file path=ppt/slides/slide11.xml><?xml version="1.0" encoding="utf-8"?>
+<p:sld xmlns:a="http://schemas.openxmlformats.org/drawingml/2006/main" xmlns:r="http://schemas.openxmlformats.org/officeDocument/2006/relationships" xmlns:p="http://schemas.openxmlformats.org/presentationml/2006/main">
+  <p:cSld>
+    <p:spTree>
+      <p:nvGrpSpPr>
+        <p:cNvPr id="1" name=""/>
+        <p:cNvGrpSpPr/>
+        <p:nvPr/>
+      </p:nvGrpSpPr>
+      <p:grpSpPr>
+        <a:xfrm>
+          <a:off x="0" y="0"/>
+          <a:ext cx="0" cy="0"/>
+          <a:chOff x="0" y="0"/>
+          <a:chExt cx="0" cy="0"/>
+        </a:xfrm>
+      </p:grpSpPr>
+      <p:grpSp>
+        <p:nvGrpSpPr>
+          <p:cNvPr id="60" name="Group 59"/>
+          <p:cNvGrpSpPr/>
+          <p:nvPr/>
+        </p:nvGrpSpPr>
+        <p:grpSpPr>
+          <a:xfrm>
+            <a:off x="-1585395" y="-1128815"/>
+            <a:ext cx="12421122" cy="9160562"/>
+            <a:chOff x="-1585395" y="-1128815"/>
+            <a:chExt cx="12421122" cy="9160562"/>
+          </a:xfrm>
+        </p:grpSpPr>
+        <p:grpSp>
+          <p:nvGrpSpPr>
+            <p:cNvPr id="57" name="Group 56"/>
+            <p:cNvGrpSpPr/>
+            <p:nvPr/>
+          </p:nvGrpSpPr>
+          <p:grpSpPr>
+            <a:xfrm>
+              <a:off x="-1585395" y="-1128815"/>
+              <a:ext cx="12421122" cy="9160562"/>
+              <a:chOff x="-1585395" y="-1128815"/>
+              <a:chExt cx="12421122" cy="9160562"/>
+            </a:xfrm>
+          </p:grpSpPr>
+          <p:grpSp>
+            <p:nvGrpSpPr>
+              <p:cNvPr id="55" name="Group 54"/>
+              <p:cNvGrpSpPr/>
+              <p:nvPr/>
+            </p:nvGrpSpPr>
+            <p:grpSpPr>
+              <a:xfrm>
+                <a:off x="-1585395" y="-1128815"/>
+                <a:ext cx="12421122" cy="9160562"/>
+                <a:chOff x="-1585395" y="-1128815"/>
+                <a:chExt cx="12421122" cy="9160562"/>
+              </a:xfrm>
+            </p:grpSpPr>
+            <p:grpSp>
+              <p:nvGrpSpPr>
+                <p:cNvPr id="30" name="Group 29"/>
+                <p:cNvGrpSpPr/>
+                <p:nvPr/>
+              </p:nvGrpSpPr>
+              <p:grpSpPr>
+                <a:xfrm>
+                  <a:off x="6451599" y="3561348"/>
+                  <a:ext cx="4384128" cy="4470399"/>
+                  <a:chOff x="6451599" y="3523248"/>
+                  <a:chExt cx="4384128" cy="4470399"/>
+                </a:xfrm>
+              </p:grpSpPr>
+              <p:pic>
+                <p:nvPicPr>
+                  <p:cNvPr id="42" name="Picture 41"/>
+                  <p:cNvPicPr>
+                    <a:picLocks noChangeAspect="1"/>
+                  </p:cNvPicPr>
+                  <p:nvPr/>
+                </p:nvPicPr>
+                <p:blipFill>
+                  <a:blip r:embed="rId3"/>
+                  <a:stretch>
+                    <a:fillRect/>
+                  </a:stretch>
+                </p:blipFill>
+                <p:spPr>
+                  <a:xfrm>
+                    <a:off x="6451599" y="3523248"/>
+                    <a:ext cx="4384128" cy="4470399"/>
+                  </a:xfrm>
+                  <a:prstGeom prst="rect">
+                    <a:avLst/>
+                  </a:prstGeom>
+                  <a:solidFill>
+                    <a:srgbClr val="FFFFFF"/>
+                  </a:solidFill>
+                </p:spPr>
+              </p:pic>
+              <p:sp>
+                <p:nvSpPr>
+                  <p:cNvPr id="43" name="TextBox 42"/>
+                  <p:cNvSpPr txBox="1"/>
+                  <p:nvPr/>
+                </p:nvSpPr>
+                <p:spPr>
+                  <a:xfrm>
+                    <a:off x="6940277" y="4021607"/>
+                    <a:ext cx="423952" cy="430887"/>
+                  </a:xfrm>
+                  <a:prstGeom prst="rect">
+                    <a:avLst/>
+                  </a:prstGeom>
+                  <a:solidFill>
+                    <a:srgbClr val="FFFFFF"/>
+                  </a:solidFill>
+                  <a:ln>
+                    <a:noFill/>
+                    <a:prstDash val="solid"/>
+                  </a:ln>
+                </p:spPr>
+                <p:txBody>
+                  <a:bodyPr wrap="none" rtlCol="0">
+                    <a:spAutoFit/>
+                  </a:bodyPr>
+                  <a:lstStyle/>
+                  <a:p>
+                    <a:r>
+                      <a:rPr lang="en-US" sz="2200" b="1" dirty="0"/>
+                      <a:t>d</a:t>
+                    </a:r>
+                    <a:r>
+                      <a:rPr lang="en-US" sz="2200" b="1" dirty="0" smtClean="0"/>
+                      <a:t>)</a:t>
+                    </a:r>
+                    <a:endParaRPr lang="en-US" sz="2200" b="1" dirty="0"/>
+                  </a:p>
+                </p:txBody>
+              </p:sp>
+              <p:sp>
+                <p:nvSpPr>
+                  <p:cNvPr id="44" name="Rectangle 43"/>
+                  <p:cNvSpPr/>
+                  <p:nvPr/>
+                </p:nvSpPr>
+                <p:spPr>
+                  <a:xfrm>
+                    <a:off x="7708900" y="7554793"/>
+                    <a:ext cx="2146300" cy="368300"/>
+                  </a:xfrm>
+                  <a:prstGeom prst="rect">
+                    <a:avLst/>
+                  </a:prstGeom>
+                  <a:solidFill>
+                    <a:srgbClr val="FFFFFF"/>
+                  </a:solidFill>
+                  <a:ln>
+                    <a:noFill/>
+                  </a:ln>
+                  <a:effectLst/>
+                </p:spPr>
+                <p:style>
+                  <a:lnRef idx="1">
+                    <a:schemeClr val="accent1"/>
+                  </a:lnRef>
+                  <a:fillRef idx="3">
+                    <a:schemeClr val="accent1"/>
+                  </a:fillRef>
+                  <a:effectRef idx="2">
+                    <a:schemeClr val="accent1"/>
+                  </a:effectRef>
+                  <a:fontRef idx="minor">
+                    <a:schemeClr val="lt1"/>
+                  </a:fontRef>
+                </p:style>
+                <p:txBody>
+                  <a:bodyPr rtlCol="0" anchor="ctr"/>
+                  <a:lstStyle/>
+                  <a:p>
+                    <a:pPr algn="ctr"/>
+                    <a:endParaRPr lang="en-US"/>
+                  </a:p>
+                </p:txBody>
+              </p:sp>
+              <p:sp>
+                <p:nvSpPr>
+                  <p:cNvPr id="48" name="TextBox 47"/>
+                  <p:cNvSpPr txBox="1"/>
+                  <p:nvPr/>
+                </p:nvSpPr>
+                <p:spPr>
+                  <a:xfrm>
+                    <a:off x="8089297" y="3523248"/>
+                    <a:ext cx="1332053" cy="430887"/>
+                  </a:xfrm>
+                  <a:prstGeom prst="rect">
+                    <a:avLst/>
+                  </a:prstGeom>
+                  <a:solidFill>
+                    <a:srgbClr val="FF0000">
+                      <a:alpha val="77000"/>
+                    </a:srgbClr>
+                  </a:solidFill>
+                  <a:ln>
+                    <a:solidFill>
+                      <a:schemeClr val="tx1"/>
+                    </a:solidFill>
+                  </a:ln>
+                </p:spPr>
+                <p:txBody>
+                  <a:bodyPr wrap="none" rtlCol="0">
+                    <a:spAutoFit/>
+                  </a:bodyPr>
+                  <a:lstStyle/>
+                  <a:p>
+                    <a:r>
+                      <a:rPr lang="en-US" sz="2200" b="1" dirty="0" smtClean="0"/>
+                      <a:t>mismatch</a:t>
+                    </a:r>
+                    <a:endParaRPr lang="en-US" sz="2200" b="1" dirty="0"/>
+                  </a:p>
+                </p:txBody>
+              </p:sp>
+            </p:grpSp>
+            <p:grpSp>
+              <p:nvGrpSpPr>
+                <p:cNvPr id="54" name="Group 53"/>
+                <p:cNvGrpSpPr/>
+                <p:nvPr/>
+              </p:nvGrpSpPr>
+              <p:grpSpPr>
+                <a:xfrm>
+                  <a:off x="-1585395" y="-1128815"/>
+                  <a:ext cx="12421122" cy="9155305"/>
+                  <a:chOff x="-1585395" y="-1128815"/>
+                  <a:chExt cx="12421122" cy="9155305"/>
+                </a:xfrm>
+              </p:grpSpPr>
+              <p:grpSp>
+                <p:nvGrpSpPr>
+                  <p:cNvPr id="53" name="Group 52"/>
+                  <p:cNvGrpSpPr/>
+                  <p:nvPr/>
+                </p:nvGrpSpPr>
+                <p:grpSpPr>
+                  <a:xfrm>
+                    <a:off x="-1585395" y="-1128815"/>
+                    <a:ext cx="8497687" cy="9155305"/>
+                    <a:chOff x="-1585395" y="-1128815"/>
+                    <a:chExt cx="8497687" cy="9155305"/>
+                  </a:xfrm>
+                </p:grpSpPr>
+                <p:grpSp>
+                  <p:nvGrpSpPr>
+                    <p:cNvPr id="24" name="Group 23"/>
+                    <p:cNvGrpSpPr/>
+                    <p:nvPr/>
+                  </p:nvGrpSpPr>
+                  <p:grpSpPr>
+                    <a:xfrm>
+                      <a:off x="-1585395" y="-1128815"/>
+                      <a:ext cx="8497687" cy="9155305"/>
+                      <a:chOff x="-124895" y="3595504"/>
+                      <a:chExt cx="8497687" cy="9155305"/>
+                    </a:xfrm>
+                  </p:grpSpPr>
+                  <p:grpSp>
+                    <p:nvGrpSpPr>
+                      <p:cNvPr id="21" name="Group 20"/>
+                      <p:cNvGrpSpPr/>
+                      <p:nvPr/>
+                    </p:nvGrpSpPr>
+                    <p:grpSpPr>
+                      <a:xfrm>
+                        <a:off x="-124895" y="3595504"/>
+                        <a:ext cx="8497687" cy="9155305"/>
+                        <a:chOff x="-124895" y="3595504"/>
+                        <a:chExt cx="8497687" cy="9155305"/>
+                      </a:xfrm>
+                    </p:grpSpPr>
+                    <p:grpSp>
+                      <p:nvGrpSpPr>
+                        <p:cNvPr id="23" name="Group 22"/>
+                        <p:cNvGrpSpPr/>
+                        <p:nvPr/>
+                      </p:nvGrpSpPr>
+                      <p:grpSpPr>
+                        <a:xfrm>
+                          <a:off x="-124895" y="3595504"/>
+                          <a:ext cx="8497687" cy="9155305"/>
+                          <a:chOff x="-112195" y="3595504"/>
+                          <a:chExt cx="8497687" cy="9155305"/>
+                        </a:xfrm>
+                      </p:grpSpPr>
+                      <p:pic>
+                        <p:nvPicPr>
+                          <p:cNvPr id="5" name="Picture 4"/>
+                          <p:cNvPicPr>
+                            <a:picLocks noChangeAspect="1"/>
+                          </p:cNvPicPr>
+                          <p:nvPr/>
+                        </p:nvPicPr>
+                        <p:blipFill rotWithShape="1">
+                          <a:blip r:embed="rId4"/>
+                          <a:srcRect l="6560"/>
+                          <a:stretch/>
+                        </p:blipFill>
+                        <p:spPr>
+                          <a:xfrm>
+                            <a:off x="4271433" y="3595504"/>
+                            <a:ext cx="4077940" cy="4450080"/>
+                          </a:xfrm>
+                          <a:prstGeom prst="rect">
+                            <a:avLst/>
+                          </a:prstGeom>
+                          <a:solidFill>
+                            <a:srgbClr val="FFFFFF"/>
+                          </a:solidFill>
+                        </p:spPr>
+                      </p:pic>
+                      <p:grpSp>
+                        <p:nvGrpSpPr>
+                          <p:cNvPr id="22" name="Group 21"/>
+                          <p:cNvGrpSpPr/>
+                          <p:nvPr/>
+                        </p:nvGrpSpPr>
+                        <p:grpSpPr>
+                          <a:xfrm>
+                            <a:off x="-112195" y="4084336"/>
+                            <a:ext cx="8497687" cy="8666473"/>
+                            <a:chOff x="-112195" y="4084336"/>
+                            <a:chExt cx="8497687" cy="8666473"/>
+                          </a:xfrm>
+                        </p:grpSpPr>
+                        <p:cxnSp>
+                          <p:nvCxnSpPr>
+                            <p:cNvPr id="7" name="Straight Connector 6"/>
+                            <p:cNvCxnSpPr/>
+                            <p:nvPr/>
+                          </p:nvCxnSpPr>
+                          <p:spPr>
+                            <a:xfrm>
+                              <a:off x="6297326" y="4085396"/>
+                              <a:ext cx="0" cy="3399137"/>
+                            </a:xfrm>
+                            <a:prstGeom prst="line">
+                              <a:avLst/>
+                            </a:prstGeom>
+                            <a:ln>
+                              <a:solidFill>
+                                <a:schemeClr val="tx1"/>
+                              </a:solidFill>
+                              <a:prstDash val="dash"/>
+                            </a:ln>
+                          </p:spPr>
+                          <p:style>
+                            <a:lnRef idx="2">
+                              <a:schemeClr val="accent1"/>
+                            </a:lnRef>
+                            <a:fillRef idx="0">
+                              <a:schemeClr val="accent1"/>
+                            </a:fillRef>
+                            <a:effectRef idx="1">
+                              <a:schemeClr val="accent1"/>
+                            </a:effectRef>
+                            <a:fontRef idx="minor">
+                              <a:schemeClr val="tx1"/>
+                            </a:fontRef>
+                          </p:style>
+                        </p:cxnSp>
+                        <p:sp>
+                          <p:nvSpPr>
+                            <p:cNvPr id="8" name="TextBox 7"/>
+                            <p:cNvSpPr txBox="1"/>
+                            <p:nvPr/>
+                          </p:nvSpPr>
+                          <p:spPr>
+                            <a:xfrm>
+                              <a:off x="6160863" y="7382935"/>
+                              <a:ext cx="301660" cy="369332"/>
+                            </a:xfrm>
+                            <a:prstGeom prst="rect">
+                              <a:avLst/>
+                            </a:prstGeom>
+                            <a:noFill/>
+                          </p:spPr>
+                          <p:txBody>
+                            <a:bodyPr wrap="none" rtlCol="0">
+                              <a:spAutoFit/>
+                            </a:bodyPr>
+                            <a:lstStyle/>
+                            <a:p>
+                              <a:r>
+                                <a:rPr lang="en-US" dirty="0" smtClean="0"/>
+                                <a:t>0</a:t>
+                              </a:r>
+                              <a:endParaRPr lang="en-US" dirty="0"/>
+                            </a:p>
+                          </p:txBody>
+                        </p:sp>
+                        <p:sp>
+                          <p:nvSpPr>
+                            <p:cNvPr id="9" name="TextBox 8"/>
+                            <p:cNvSpPr txBox="1"/>
+                            <p:nvPr/>
+                          </p:nvSpPr>
+                          <p:spPr>
+                            <a:xfrm>
+                              <a:off x="5805201" y="4084336"/>
+                              <a:ext cx="942820" cy="430887"/>
+                            </a:xfrm>
+                            <a:prstGeom prst="rect">
+                              <a:avLst/>
+                            </a:prstGeom>
+                            <a:solidFill>
+                              <a:schemeClr val="tx2">
+                                <a:lumMod val="40000"/>
+                                <a:lumOff val="60000"/>
+                              </a:schemeClr>
+                            </a:solidFill>
+                            <a:ln>
+                              <a:solidFill>
+                                <a:schemeClr val="tx1"/>
+                              </a:solidFill>
+                              <a:prstDash val="solid"/>
+                            </a:ln>
+                          </p:spPr>
+                          <p:txBody>
+                            <a:bodyPr wrap="square" rtlCol="0">
+                              <a:spAutoFit/>
+                            </a:bodyPr>
+                            <a:lstStyle/>
+                            <a:p>
+                              <a:pPr algn="ctr"/>
+                              <a:r>
+                                <a:rPr lang="en-US" sz="2200" b="1" dirty="0" smtClean="0"/>
+                                <a:t>match</a:t>
+                              </a:r>
+                              <a:endParaRPr lang="en-US" sz="2200" b="1" dirty="0"/>
+                            </a:p>
+                          </p:txBody>
+                        </p:sp>
+                        <p:sp>
+                          <p:nvSpPr>
+                            <p:cNvPr id="10" name="TextBox 9"/>
+                            <p:cNvSpPr txBox="1"/>
+                            <p:nvPr/>
+                          </p:nvSpPr>
+                          <p:spPr>
+                            <a:xfrm rot="4253040">
+                              <a:off x="6506386" y="5449077"/>
+                              <a:ext cx="1332053" cy="430887"/>
+                            </a:xfrm>
+                            <a:prstGeom prst="rect">
+                              <a:avLst/>
+                            </a:prstGeom>
+                            <a:solidFill>
+                              <a:srgbClr val="FF0000">
+                                <a:alpha val="77000"/>
+                              </a:srgbClr>
+                            </a:solidFill>
+                            <a:ln>
+                              <a:solidFill>
+                                <a:schemeClr val="tx1"/>
+                              </a:solidFill>
+                            </a:ln>
+                          </p:spPr>
+                          <p:txBody>
+                            <a:bodyPr wrap="none" rtlCol="0">
+                              <a:spAutoFit/>
+                            </a:bodyPr>
+                            <a:lstStyle/>
+                            <a:p>
+                              <a:r>
+                                <a:rPr lang="en-US" sz="2200" b="1" dirty="0" smtClean="0"/>
+                                <a:t>mismatch</a:t>
+                              </a:r>
+                              <a:endParaRPr lang="en-US" sz="2200" b="1" dirty="0"/>
+                            </a:p>
+                          </p:txBody>
+                        </p:sp>
+                        <p:pic>
+                          <p:nvPicPr>
+                            <p:cNvPr id="6" name="Picture 5"/>
+                            <p:cNvPicPr>
+                              <a:picLocks noChangeAspect="1"/>
+                            </p:cNvPicPr>
+                            <p:nvPr/>
+                          </p:nvPicPr>
+                          <p:blipFill rotWithShape="1">
+                            <a:blip r:embed="rId5"/>
+                            <a:srcRect t="9177"/>
+                            <a:stretch/>
+                          </p:blipFill>
+                          <p:spPr>
+                            <a:xfrm>
+                              <a:off x="4012434" y="8700921"/>
+                              <a:ext cx="4373058" cy="4049888"/>
+                            </a:xfrm>
+                            <a:prstGeom prst="rect">
+                              <a:avLst/>
+                            </a:prstGeom>
+                            <a:solidFill>
+                              <a:srgbClr val="FFFFFF"/>
+                            </a:solidFill>
+                          </p:spPr>
+                        </p:pic>
+                        <p:sp>
+                          <p:nvSpPr>
+                            <p:cNvPr id="11" name="Right Arrow 10"/>
+                            <p:cNvSpPr/>
+                            <p:nvPr/>
+                          </p:nvSpPr>
+                          <p:spPr>
+                            <a:xfrm rot="3973453">
+                              <a:off x="6559804" y="4610704"/>
+                              <a:ext cx="537208" cy="375539"/>
+                            </a:xfrm>
+                            <a:prstGeom prst="rightArrow">
+                              <a:avLst/>
+                            </a:prstGeom>
+                            <a:solidFill>
+                              <a:srgbClr val="D9D9D9"/>
+                            </a:solidFill>
+                            <a:ln>
+                              <a:solidFill>
+                                <a:schemeClr val="tx1"/>
+                              </a:solidFill>
+                            </a:ln>
+                            <a:effectLst/>
+                          </p:spPr>
+                          <p:style>
+                            <a:lnRef idx="1">
+                              <a:schemeClr val="accent1"/>
+                            </a:lnRef>
+                            <a:fillRef idx="3">
+                              <a:schemeClr val="accent1"/>
+                            </a:fillRef>
+                            <a:effectRef idx="2">
+                              <a:schemeClr val="accent1"/>
+                            </a:effectRef>
+                            <a:fontRef idx="minor">
+                              <a:schemeClr val="lt1"/>
+                            </a:fontRef>
+                          </p:style>
+                          <p:txBody>
+                            <a:bodyPr rtlCol="0" anchor="ctr"/>
+                            <a:lstStyle/>
+                            <a:p>
+                              <a:pPr algn="ctr"/>
+                              <a:endParaRPr lang="en-US"/>
+                            </a:p>
+                          </p:txBody>
+                        </p:sp>
+                        <p:sp>
+                          <p:nvSpPr>
+                            <p:cNvPr id="12" name="TextBox 11"/>
+                            <p:cNvSpPr txBox="1"/>
+                            <p:nvPr/>
+                          </p:nvSpPr>
+                          <p:spPr>
+                            <a:xfrm rot="17332499">
+                              <a:off x="4723797" y="5440594"/>
+                              <a:ext cx="1332053" cy="430887"/>
+                            </a:xfrm>
+                            <a:prstGeom prst="rect">
+                              <a:avLst/>
+                            </a:prstGeom>
+                            <a:solidFill>
+                              <a:srgbClr val="FF0000">
+                                <a:alpha val="77000"/>
+                              </a:srgbClr>
+                            </a:solidFill>
+                            <a:ln>
+                              <a:solidFill>
+                                <a:schemeClr val="tx1"/>
+                              </a:solidFill>
+                            </a:ln>
+                          </p:spPr>
+                          <p:txBody>
+                            <a:bodyPr wrap="none" rtlCol="0">
+                              <a:spAutoFit/>
+                            </a:bodyPr>
+                            <a:lstStyle/>
+                            <a:p>
+                              <a:r>
+                                <a:rPr lang="en-US" sz="2200" b="1" dirty="0" smtClean="0"/>
+                                <a:t>mismatch</a:t>
+                              </a:r>
+                              <a:endParaRPr lang="en-US" sz="2200" b="1" dirty="0"/>
+                            </a:p>
+                          </p:txBody>
+                        </p:sp>
+                        <p:sp>
+                          <p:nvSpPr>
+                            <p:cNvPr id="13" name="Right Arrow 12"/>
+                            <p:cNvSpPr/>
+                            <p:nvPr/>
+                          </p:nvSpPr>
+                          <p:spPr>
+                            <a:xfrm rot="6985390">
+                              <a:off x="5453672" y="4604345"/>
+                              <a:ext cx="537208" cy="375539"/>
+                            </a:xfrm>
+                            <a:prstGeom prst="rightArrow">
+                              <a:avLst/>
+                            </a:prstGeom>
+                            <a:solidFill>
+                              <a:srgbClr val="D9D9D9"/>
+                            </a:solidFill>
+                            <a:ln>
+                              <a:solidFill>
+                                <a:schemeClr val="tx1"/>
+                              </a:solidFill>
+                            </a:ln>
+                            <a:effectLst/>
+                          </p:spPr>
+                          <p:style>
+                            <a:lnRef idx="1">
+                              <a:schemeClr val="accent1"/>
+                            </a:lnRef>
+                            <a:fillRef idx="3">
+                              <a:schemeClr val="accent1"/>
+                            </a:fillRef>
+                            <a:effectRef idx="2">
+                              <a:schemeClr val="accent1"/>
+                            </a:effectRef>
+                            <a:fontRef idx="minor">
+                              <a:schemeClr val="lt1"/>
+                            </a:fontRef>
+                          </p:style>
+                          <p:txBody>
+                            <a:bodyPr rtlCol="0" anchor="ctr"/>
+                            <a:lstStyle/>
+                            <a:p>
+                              <a:pPr algn="ctr"/>
+                              <a:endParaRPr lang="en-US"/>
+                            </a:p>
+                          </p:txBody>
+                        </p:sp>
+                        <p:sp>
+                          <p:nvSpPr>
+                            <p:cNvPr id="14" name="TextBox 13"/>
+                            <p:cNvSpPr txBox="1"/>
+                            <p:nvPr/>
+                          </p:nvSpPr>
+                          <p:spPr>
+                            <a:xfrm>
+                              <a:off x="4499772" y="8786738"/>
+                              <a:ext cx="389512" cy="430887"/>
+                            </a:xfrm>
+                            <a:prstGeom prst="rect">
+                              <a:avLst/>
+                            </a:prstGeom>
+                            <a:solidFill>
+                              <a:srgbClr val="FFFFFF"/>
+                            </a:solidFill>
+                            <a:ln>
+                              <a:noFill/>
+                              <a:prstDash val="solid"/>
+                            </a:ln>
+                          </p:spPr>
+                          <p:txBody>
+                            <a:bodyPr wrap="none" rtlCol="0">
+                              <a:spAutoFit/>
+                            </a:bodyPr>
+                            <a:lstStyle/>
+                            <a:p>
+                              <a:r>
+                                <a:rPr lang="en-US" sz="2200" b="1" dirty="0" smtClean="0"/>
+                                <a:t>c</a:t>
+                              </a:r>
+                              <a:r>
+                                <a:rPr lang="en-US" sz="2200" b="1" dirty="0" smtClean="0"/>
+                                <a:t>)</a:t>
+                              </a:r>
+                              <a:endParaRPr lang="en-US" sz="2200" b="1" dirty="0"/>
+                            </a:p>
+                          </p:txBody>
+                        </p:sp>
+                        <p:sp>
+                          <p:nvSpPr>
+                            <p:cNvPr id="19" name="TextBox 18"/>
+                            <p:cNvSpPr txBox="1"/>
+                            <p:nvPr/>
+                          </p:nvSpPr>
+                          <p:spPr>
+                            <a:xfrm>
+                              <a:off x="4474916" y="4085396"/>
+                              <a:ext cx="411829" cy="430887"/>
+                            </a:xfrm>
+                            <a:prstGeom prst="rect">
+                              <a:avLst/>
+                            </a:prstGeom>
+                            <a:solidFill>
+                              <a:srgbClr val="FFFFFF"/>
+                            </a:solidFill>
+                            <a:ln>
+                              <a:noFill/>
+                              <a:prstDash val="solid"/>
+                            </a:ln>
+                          </p:spPr>
+                          <p:txBody>
+                            <a:bodyPr wrap="none" rtlCol="0">
+                              <a:spAutoFit/>
+                            </a:bodyPr>
+                            <a:lstStyle/>
+                            <a:p>
+                              <a:r>
+                                <a:rPr lang="en-US" sz="2200" b="1" dirty="0"/>
+                                <a:t>a</a:t>
+                              </a:r>
+                              <a:r>
+                                <a:rPr lang="en-US" sz="2200" b="1" dirty="0" smtClean="0"/>
+                                <a:t>)</a:t>
+                              </a:r>
+                              <a:endParaRPr lang="en-US" sz="2200" b="1" dirty="0"/>
+                            </a:p>
+                          </p:txBody>
+                        </p:sp>
+                        <p:sp>
+                          <p:nvSpPr>
+                            <p:cNvPr id="20" name="TextBox 19"/>
+                            <p:cNvSpPr txBox="1"/>
+                            <p:nvPr/>
+                          </p:nvSpPr>
+                          <p:spPr>
+                            <a:xfrm rot="16200000">
+                              <a:off x="-2063208" y="10274779"/>
+                              <a:ext cx="4425246" cy="523220"/>
+                            </a:xfrm>
+                            <a:prstGeom prst="rect">
+                              <a:avLst/>
+                            </a:prstGeom>
+                            <a:solidFill>
+                              <a:srgbClr val="FFFFFF"/>
+                            </a:solidFill>
+                          </p:spPr>
+                          <p:txBody>
+                            <a:bodyPr wrap="square" rtlCol="0">
+                              <a:spAutoFit/>
+                            </a:bodyPr>
+                            <a:lstStyle/>
+                            <a:p>
+                              <a:pPr algn="ctr"/>
+                              <a:r>
+                                <a:rPr lang="en-US" sz="2800" dirty="0" smtClean="0"/>
+                                <a:t>Abundance</a:t>
+                              </a:r>
+                              <a:endParaRPr lang="en-US" sz="2800" dirty="0"/>
+                            </a:p>
+                          </p:txBody>
+                        </p:sp>
+                      </p:grpSp>
+                    </p:grpSp>
+                    <p:sp>
+                      <p:nvSpPr>
+                        <p:cNvPr id="31" name="Rectangle 30"/>
+                        <p:cNvSpPr/>
+                        <p:nvPr/>
+                      </p:nvSpPr>
+                      <p:spPr>
+                        <a:xfrm rot="17276937">
+                          <a:off x="4852811" y="5276837"/>
+                          <a:ext cx="416901" cy="338554"/>
+                        </a:xfrm>
+                        <a:prstGeom prst="rect">
+                          <a:avLst/>
+                        </a:prstGeom>
+                      </p:spPr>
+                      <p:txBody>
+                        <a:bodyPr wrap="none">
+                          <a:spAutoFit/>
+                        </a:bodyPr>
+                        <a:lstStyle/>
+                        <a:p>
+                          <a:r>
+                            <a:rPr lang="en-US" sz="1600" dirty="0" smtClean="0"/>
+                            <a:t>(b) </a:t>
+                          </a:r>
+                          <a:endParaRPr lang="en-US" sz="1600" dirty="0"/>
+                        </a:p>
+                      </p:txBody>
+                    </p:sp>
+                    <p:sp>
+                      <p:nvSpPr>
+                        <p:cNvPr id="32" name="Rectangle 31"/>
+                        <p:cNvSpPr/>
+                        <p:nvPr/>
+                      </p:nvSpPr>
+                      <p:spPr>
+                        <a:xfrm rot="4181040">
+                          <a:off x="7231284" y="5207488"/>
+                          <a:ext cx="416901" cy="338554"/>
+                        </a:xfrm>
+                        <a:prstGeom prst="rect">
+                          <a:avLst/>
+                        </a:prstGeom>
+                      </p:spPr>
+                      <p:txBody>
+                        <a:bodyPr wrap="none">
+                          <a:spAutoFit/>
+                        </a:bodyPr>
+                        <a:lstStyle/>
+                        <a:p>
+                          <a:r>
+                            <a:rPr lang="en-US" sz="1600" dirty="0" smtClean="0"/>
+                            <a:t>(d) </a:t>
+                          </a:r>
+                          <a:endParaRPr lang="en-US" sz="1600" dirty="0"/>
+                        </a:p>
+                      </p:txBody>
+                    </p:sp>
+                  </p:grpSp>
+                  <p:sp>
+                    <p:nvSpPr>
+                      <p:cNvPr id="28" name="TextBox 27"/>
+                      <p:cNvSpPr txBox="1"/>
+                      <p:nvPr/>
+                    </p:nvSpPr>
+                    <p:spPr>
+                      <a:xfrm rot="16200000">
+                        <a:off x="3554062" y="5468514"/>
+                        <a:ext cx="1200519" cy="523220"/>
+                      </a:xfrm>
+                      <a:prstGeom prst="rect">
+                        <a:avLst/>
+                      </a:prstGeom>
+                      <a:solidFill>
+                        <a:srgbClr val="FFFFFF"/>
+                      </a:solidFill>
+                    </p:spPr>
+                    <p:txBody>
+                      <a:bodyPr wrap="none" rtlCol="0">
+                        <a:spAutoFit/>
+                      </a:bodyPr>
+                      <a:lstStyle/>
+                      <a:p>
+                        <a:r>
+                          <a:rPr lang="en-US" sz="2800" dirty="0" smtClean="0"/>
+                          <a:t>Fitness</a:t>
+                        </a:r>
+                        <a:endParaRPr lang="en-US" sz="2800" dirty="0"/>
+                      </a:p>
+                    </p:txBody>
+                  </p:sp>
+                </p:grpSp>
+                <p:sp>
+                  <p:nvSpPr>
+                    <p:cNvPr id="46" name="Rectangle 45"/>
+                    <p:cNvSpPr/>
+                    <p:nvPr/>
+                  </p:nvSpPr>
+                  <p:spPr>
+                    <a:xfrm>
+                      <a:off x="4593461" y="-973937"/>
+                      <a:ext cx="395862" cy="338554"/>
+                    </a:xfrm>
+                    <a:prstGeom prst="rect">
+                      <a:avLst/>
+                    </a:prstGeom>
+                  </p:spPr>
+                  <p:txBody>
+                    <a:bodyPr wrap="none">
+                      <a:spAutoFit/>
+                    </a:bodyPr>
+                    <a:lstStyle/>
+                    <a:p>
+                      <a:r>
+                        <a:rPr lang="en-US" sz="1600" dirty="0" smtClean="0"/>
+                        <a:t>(c) </a:t>
+                      </a:r>
+                      <a:endParaRPr lang="en-US" sz="1600" dirty="0"/>
+                    </a:p>
+                  </p:txBody>
+                </p:sp>
+              </p:grpSp>
+              <p:sp>
+                <p:nvSpPr>
+                  <p:cNvPr id="33" name="Rectangle 32"/>
+                  <p:cNvSpPr/>
+                  <p:nvPr/>
+                </p:nvSpPr>
+                <p:spPr>
+                  <a:xfrm>
+                    <a:off x="-1585395" y="3429000"/>
+                    <a:ext cx="12421122" cy="4557592"/>
+                  </a:xfrm>
+                  <a:prstGeom prst="rect">
+                    <a:avLst/>
+                  </a:prstGeom>
+                  <a:noFill/>
+                  <a:ln>
+                    <a:solidFill>
+                      <a:schemeClr val="tx1"/>
+                    </a:solidFill>
+                  </a:ln>
+                  <a:effectLst/>
+                </p:spPr>
+                <p:style>
+                  <a:lnRef idx="1">
+                    <a:schemeClr val="accent1"/>
+                  </a:lnRef>
+                  <a:fillRef idx="3">
+                    <a:schemeClr val="accent1"/>
+                  </a:fillRef>
+                  <a:effectRef idx="2">
+                    <a:schemeClr val="accent1"/>
+                  </a:effectRef>
+                  <a:fontRef idx="minor">
+                    <a:schemeClr val="lt1"/>
+                  </a:fontRef>
+                </p:style>
+                <p:txBody>
+                  <a:bodyPr rtlCol="0" anchor="ctr"/>
+                  <a:lstStyle/>
+                  <a:p>
+                    <a:pPr algn="ctr"/>
+                    <a:endParaRPr lang="en-US"/>
+                  </a:p>
+                </p:txBody>
+              </p:sp>
+            </p:grpSp>
+            <p:grpSp>
+              <p:nvGrpSpPr>
+                <p:cNvPr id="52" name="Group 51"/>
+                <p:cNvGrpSpPr/>
+                <p:nvPr/>
+              </p:nvGrpSpPr>
+              <p:grpSpPr>
+                <a:xfrm>
+                  <a:off x="-1176474" y="3546628"/>
+                  <a:ext cx="6603695" cy="4427264"/>
+                  <a:chOff x="-1176474" y="3546628"/>
+                  <a:chExt cx="6603695" cy="4427264"/>
+                </a:xfrm>
+              </p:grpSpPr>
+              <p:sp>
+                <p:nvSpPr>
+                  <p:cNvPr id="49" name="TextBox 48"/>
+                  <p:cNvSpPr txBox="1"/>
+                  <p:nvPr/>
+                </p:nvSpPr>
+                <p:spPr>
+                  <a:xfrm>
+                    <a:off x="4484401" y="3558415"/>
+                    <a:ext cx="942820" cy="430887"/>
+                  </a:xfrm>
+                  <a:prstGeom prst="rect">
+                    <a:avLst/>
+                  </a:prstGeom>
+                  <a:solidFill>
+                    <a:schemeClr val="tx2">
+                      <a:lumMod val="40000"/>
+                      <a:lumOff val="60000"/>
+                    </a:schemeClr>
+                  </a:solidFill>
+                  <a:ln>
+                    <a:solidFill>
+                      <a:schemeClr val="tx1"/>
+                    </a:solidFill>
+                    <a:prstDash val="solid"/>
+                  </a:ln>
+                </p:spPr>
+                <p:txBody>
+                  <a:bodyPr wrap="square" rtlCol="0">
+                    <a:spAutoFit/>
+                  </a:bodyPr>
+                  <a:lstStyle/>
+                  <a:p>
+                    <a:pPr algn="ctr"/>
+                    <a:r>
+                      <a:rPr lang="en-US" sz="2200" b="1" dirty="0" smtClean="0"/>
+                      <a:t>match</a:t>
+                    </a:r>
+                    <a:endParaRPr lang="en-US" sz="2200" b="1" dirty="0"/>
+                  </a:p>
+                </p:txBody>
+              </p:sp>
+              <p:grpSp>
+                <p:nvGrpSpPr>
+                  <p:cNvPr id="51" name="Group 50"/>
+                  <p:cNvGrpSpPr/>
+                  <p:nvPr/>
+                </p:nvGrpSpPr>
+                <p:grpSpPr>
+                  <a:xfrm>
+                    <a:off x="-1176474" y="3546628"/>
+                    <a:ext cx="4114146" cy="4427264"/>
+                    <a:chOff x="-1176474" y="3546628"/>
+                    <a:chExt cx="4114146" cy="4427264"/>
+                  </a:xfrm>
+                </p:grpSpPr>
+                <p:grpSp>
+                  <p:nvGrpSpPr>
+                    <p:cNvPr id="50" name="Group 49"/>
+                    <p:cNvGrpSpPr/>
+                    <p:nvPr/>
+                  </p:nvGrpSpPr>
+                  <p:grpSpPr>
+                    <a:xfrm>
+                      <a:off x="-1176474" y="3546628"/>
+                      <a:ext cx="4114146" cy="4427264"/>
+                      <a:chOff x="-1176474" y="3546628"/>
+                      <a:chExt cx="4114146" cy="4427264"/>
+                    </a:xfrm>
+                  </p:grpSpPr>
+                  <p:sp>
+                    <p:nvSpPr>
+                      <p:cNvPr id="45" name="TextBox 44"/>
+                      <p:cNvSpPr txBox="1"/>
+                      <p:nvPr/>
+                    </p:nvSpPr>
+                    <p:spPr>
+                      <a:xfrm>
+                        <a:off x="-973928" y="4049719"/>
+                        <a:ext cx="418441" cy="430887"/>
+                      </a:xfrm>
+                      <a:prstGeom prst="rect">
+                        <a:avLst/>
+                      </a:prstGeom>
+                      <a:solidFill>
+                        <a:srgbClr val="FFFFFF"/>
+                      </a:solidFill>
+                      <a:ln>
+                        <a:noFill/>
+                        <a:prstDash val="solid"/>
+                      </a:ln>
+                    </p:spPr>
+                    <p:txBody>
+                      <a:bodyPr wrap="none" rtlCol="0">
+                        <a:spAutoFit/>
+                      </a:bodyPr>
+                      <a:lstStyle/>
+                      <a:p>
+                        <a:r>
+                          <a:rPr lang="en-US" sz="2200" dirty="0"/>
+                          <a:t>b</a:t>
+                        </a:r>
+                        <a:r>
+                          <a:rPr lang="en-US" sz="2200" dirty="0" smtClean="0"/>
+                          <a:t>)</a:t>
+                        </a:r>
+                        <a:endParaRPr lang="en-US" sz="2200" dirty="0"/>
+                      </a:p>
+                    </p:txBody>
+                  </p:sp>
+                  <p:pic>
+                    <p:nvPicPr>
+                      <p:cNvPr id="41" name="Picture 40"/>
+                      <p:cNvPicPr>
+                        <a:picLocks noChangeAspect="1"/>
+                      </p:cNvPicPr>
+                      <p:nvPr/>
+                    </p:nvPicPr>
+                    <p:blipFill rotWithShape="1">
+                      <a:blip r:embed="rId6"/>
+                      <a:srcRect l="6269" b="1127"/>
+                      <a:stretch/>
+                    </p:blipFill>
+                    <p:spPr>
+                      <a:xfrm>
+                        <a:off x="-1176474" y="3548648"/>
+                        <a:ext cx="4114146" cy="4425244"/>
+                      </a:xfrm>
+                      <a:prstGeom prst="rect">
+                        <a:avLst/>
+                      </a:prstGeom>
+                      <a:solidFill>
+                        <a:schemeClr val="bg1"/>
+                      </a:solidFill>
+                    </p:spPr>
+                  </p:pic>
+                  <p:sp>
+                    <p:nvSpPr>
+                      <p:cNvPr id="47" name="TextBox 46"/>
+                      <p:cNvSpPr txBox="1"/>
+                      <p:nvPr/>
+                    </p:nvSpPr>
+                    <p:spPr>
+                      <a:xfrm>
+                        <a:off x="240697" y="3546628"/>
+                        <a:ext cx="1332053" cy="430887"/>
+                      </a:xfrm>
+                      <a:prstGeom prst="rect">
+                        <a:avLst/>
+                      </a:prstGeom>
+                      <a:solidFill>
+                        <a:srgbClr val="FF0000">
+                          <a:alpha val="77000"/>
+                        </a:srgbClr>
+                      </a:solidFill>
+                      <a:ln>
+                        <a:solidFill>
+                          <a:schemeClr val="tx1"/>
+                        </a:solidFill>
+                      </a:ln>
+                    </p:spPr>
+                    <p:txBody>
+                      <a:bodyPr wrap="none" rtlCol="0">
+                        <a:spAutoFit/>
+                      </a:bodyPr>
+                      <a:lstStyle/>
+                      <a:p>
+                        <a:r>
+                          <a:rPr lang="en-US" sz="2200" b="1" dirty="0" smtClean="0"/>
+                          <a:t>mismatch</a:t>
+                        </a:r>
+                        <a:endParaRPr lang="en-US" sz="2200" b="1" dirty="0"/>
+                      </a:p>
+                    </p:txBody>
+                  </p:sp>
+                </p:grpSp>
+                <p:sp>
+                  <p:nvSpPr>
+                    <p:cNvPr id="27" name="Rectangle 26"/>
+                    <p:cNvSpPr/>
+                    <p:nvPr/>
+                  </p:nvSpPr>
+                  <p:spPr>
+                    <a:xfrm>
+                      <a:off x="-177800" y="7594601"/>
+                      <a:ext cx="2146300" cy="368300"/>
+                    </a:xfrm>
+                    <a:prstGeom prst="rect">
+                      <a:avLst/>
+                    </a:prstGeom>
+                    <a:solidFill>
+                      <a:srgbClr val="FFFFFF"/>
+                    </a:solidFill>
+                    <a:ln>
+                      <a:noFill/>
+                    </a:ln>
+                    <a:effectLst/>
+                  </p:spPr>
+                  <p:style>
+                    <a:lnRef idx="1">
+                      <a:schemeClr val="accent1"/>
+                    </a:lnRef>
+                    <a:fillRef idx="3">
+                      <a:schemeClr val="accent1"/>
+                    </a:fillRef>
+                    <a:effectRef idx="2">
+                      <a:schemeClr val="accent1"/>
+                    </a:effectRef>
+                    <a:fontRef idx="minor">
+                      <a:schemeClr val="lt1"/>
+                    </a:fontRef>
+                  </p:style>
+                  <p:txBody>
+                    <a:bodyPr rtlCol="0" anchor="ctr"/>
+                    <a:lstStyle/>
+                    <a:p>
+                      <a:pPr algn="ctr"/>
+                      <a:endParaRPr lang="en-US"/>
+                    </a:p>
+                  </p:txBody>
+                </p:sp>
+              </p:grpSp>
+            </p:grpSp>
+          </p:grpSp>
+          <p:sp>
+            <p:nvSpPr>
+              <p:cNvPr id="56" name="TextBox 55"/>
+              <p:cNvSpPr txBox="1"/>
+              <p:nvPr/>
+            </p:nvSpPr>
+            <p:spPr>
+              <a:xfrm>
+                <a:off x="-952897" y="4052802"/>
+                <a:ext cx="423952" cy="430887"/>
+              </a:xfrm>
+              <a:prstGeom prst="rect">
+                <a:avLst/>
+              </a:prstGeom>
+              <a:solidFill>
+                <a:srgbClr val="FFFFFF"/>
+              </a:solidFill>
+              <a:ln>
+                <a:noFill/>
+                <a:prstDash val="solid"/>
+              </a:ln>
+            </p:spPr>
+            <p:txBody>
+              <a:bodyPr wrap="none" rtlCol="0">
+                <a:spAutoFit/>
+              </a:bodyPr>
+              <a:lstStyle/>
+              <a:p>
+                <a:r>
+                  <a:rPr lang="en-US" sz="2200" b="1" dirty="0"/>
+                  <a:t>b</a:t>
+                </a:r>
+                <a:r>
+                  <a:rPr lang="en-US" sz="2200" b="1" dirty="0" smtClean="0"/>
+                  <a:t>)</a:t>
+                </a:r>
+                <a:endParaRPr lang="en-US" sz="2200" b="1" dirty="0"/>
+              </a:p>
+            </p:txBody>
+          </p:sp>
+        </p:grpSp>
+        <p:sp>
+          <p:nvSpPr>
+            <p:cNvPr id="58" name="TextBox 57"/>
+            <p:cNvSpPr txBox="1"/>
+            <p:nvPr/>
+          </p:nvSpPr>
+          <p:spPr>
+            <a:xfrm>
+              <a:off x="-952897" y="4716694"/>
+              <a:ext cx="1341558" cy="430887"/>
+            </a:xfrm>
+            <a:prstGeom prst="rect">
+              <a:avLst/>
+            </a:prstGeom>
+            <a:noFill/>
+            <a:ln>
+              <a:noFill/>
+            </a:ln>
+          </p:spPr>
+          <p:txBody>
+            <a:bodyPr wrap="none" rtlCol="0">
+              <a:spAutoFit/>
+            </a:bodyPr>
+            <a:lstStyle/>
+            <a:p>
+              <a:r>
+                <a:rPr lang="en-US" sz="2200" dirty="0" smtClean="0">
+                  <a:solidFill>
+                    <a:srgbClr val="FF0000"/>
+                  </a:solidFill>
+                </a:rPr>
+                <a:t>consumer</a:t>
+              </a:r>
+              <a:endParaRPr lang="en-US" sz="2200" dirty="0">
+                <a:solidFill>
+                  <a:srgbClr val="FF0000"/>
+                </a:solidFill>
+              </a:endParaRPr>
+            </a:p>
+          </p:txBody>
+        </p:sp>
+        <p:sp>
+          <p:nvSpPr>
+            <p:cNvPr id="59" name="TextBox 58"/>
+            <p:cNvSpPr txBox="1"/>
+            <p:nvPr/>
+          </p:nvSpPr>
+          <p:spPr>
+            <a:xfrm>
+              <a:off x="1090653" y="4062419"/>
+              <a:ext cx="1202974" cy="430887"/>
+            </a:xfrm>
+            <a:prstGeom prst="rect">
+              <a:avLst/>
+            </a:prstGeom>
+            <a:noFill/>
+            <a:ln>
+              <a:noFill/>
+            </a:ln>
+          </p:spPr>
+          <p:txBody>
+            <a:bodyPr wrap="none" rtlCol="0">
+              <a:spAutoFit/>
+            </a:bodyPr>
+            <a:lstStyle/>
+            <a:p>
+              <a:r>
+                <a:rPr lang="en-US" sz="2200" dirty="0" smtClean="0"/>
+                <a:t>resource</a:t>
+              </a:r>
+              <a:endParaRPr lang="en-US" sz="2200" dirty="0"/>
+            </a:p>
+          </p:txBody>
+        </p:sp>
+      </p:grpSp>
+    </p:spTree>
+    <p:extLst>
+      <p:ext uri="{BB962C8B-B14F-4D97-AF65-F5344CB8AC3E}">
+        <p14:creationId xmlns:p14="http://schemas.microsoft.com/office/powerpoint/2010/main" val="3779221071"/>
+      </p:ext>
+    </p:extLst>
+  </p:cSld>
+  <p:clrMapOvr>
+    <a:masterClrMapping/>
+  </p:clrMapOvr>
+</p:sld>
+</file>
+
+<file path=ppt/slides/slide12.xml><?xml version="1.0" encoding="utf-8"?>
+<p:sld xmlns:a="http://schemas.openxmlformats.org/drawingml/2006/main" xmlns:r="http://schemas.openxmlformats.org/officeDocument/2006/relationships" xmlns:p="http://schemas.openxmlformats.org/presentationml/2006/main">
+  <p:cSld>
+    <p:spTree>
+      <p:nvGrpSpPr>
+        <p:cNvPr id="1" name=""/>
+        <p:cNvGrpSpPr/>
+        <p:nvPr/>
+      </p:nvGrpSpPr>
+      <p:grpSpPr>
+        <a:xfrm>
+          <a:off x="0" y="0"/>
+          <a:ext cx="0" cy="0"/>
+          <a:chOff x="0" y="0"/>
+          <a:chExt cx="0" cy="0"/>
+        </a:xfrm>
+      </p:grpSpPr>
       <p:pic>
         <p:nvPicPr>
           <p:cNvPr id="4" name="Picture 3"/>
@@ -4727,7 +7261,7 @@
 </p:sld>
 </file>
 
-<file path=ppt/slides/slide11.xml><?xml version="1.0" encoding="utf-8"?>
+<file path=ppt/slides/slide13.xml><?xml version="1.0" encoding="utf-8"?>
 <p:sld xmlns:a="http://schemas.openxmlformats.org/drawingml/2006/main" xmlns:r="http://schemas.openxmlformats.org/officeDocument/2006/relationships" xmlns:p="http://schemas.openxmlformats.org/presentationml/2006/main">
   <p:cSld>
     <p:spTree>
@@ -5171,7 +7705,7 @@
 </p:sld>
 </file>
 
-<file path=ppt/slides/slide12.xml><?xml version="1.0" encoding="utf-8"?>
+<file path=ppt/slides/slide14.xml><?xml version="1.0" encoding="utf-8"?>
 <p:sld xmlns:a="http://schemas.openxmlformats.org/drawingml/2006/main" xmlns:r="http://schemas.openxmlformats.org/officeDocument/2006/relationships" xmlns:p="http://schemas.openxmlformats.org/presentationml/2006/main">
   <p:cSld>
     <p:spTree>
@@ -5335,1133 +7869,7 @@
 </p:sld>
 </file>
 
-<file path=ppt/slides/slide13.xml><?xml version="1.0" encoding="utf-8"?>
-<p:sld xmlns:a="http://schemas.openxmlformats.org/drawingml/2006/main" xmlns:r="http://schemas.openxmlformats.org/officeDocument/2006/relationships" xmlns:p="http://schemas.openxmlformats.org/presentationml/2006/main">
-  <p:cSld>
-    <p:spTree>
-      <p:nvGrpSpPr>
-        <p:cNvPr id="1" name=""/>
-        <p:cNvGrpSpPr/>
-        <p:nvPr/>
-      </p:nvGrpSpPr>
-      <p:grpSpPr>
-        <a:xfrm>
-          <a:off x="0" y="0"/>
-          <a:ext cx="0" cy="0"/>
-          <a:chOff x="0" y="0"/>
-          <a:chExt cx="0" cy="0"/>
-        </a:xfrm>
-      </p:grpSpPr>
-      <p:sp>
-        <p:nvSpPr>
-          <p:cNvPr id="2" name="Rectangle 1"/>
-          <p:cNvSpPr/>
-          <p:nvPr/>
-        </p:nvSpPr>
-        <p:spPr>
-          <a:xfrm rot="17307091">
-            <a:off x="4517126" y="5278685"/>
-            <a:ext cx="445930" cy="369332"/>
-          </a:xfrm>
-          <a:prstGeom prst="rect">
-            <a:avLst/>
-          </a:prstGeom>
-        </p:spPr>
-        <p:txBody>
-          <a:bodyPr wrap="none">
-            <a:spAutoFit/>
-          </a:bodyPr>
-          <a:lstStyle/>
-          <a:p>
-            <a:r>
-              <a:rPr lang="en-US" dirty="0"/>
-              <a:t>(b) </a:t>
-            </a:r>
-          </a:p>
-        </p:txBody>
-      </p:sp>
-      <p:sp>
-        <p:nvSpPr>
-          <p:cNvPr id="16" name="Rectangle 15"/>
-          <p:cNvSpPr/>
-          <p:nvPr/>
-        </p:nvSpPr>
-        <p:spPr>
-          <a:xfrm rot="4260021">
-            <a:off x="7061463" y="5340874"/>
-            <a:ext cx="422261" cy="369332"/>
-          </a:xfrm>
-          <a:prstGeom prst="rect">
-            <a:avLst/>
-          </a:prstGeom>
-        </p:spPr>
-        <p:txBody>
-          <a:bodyPr wrap="none">
-            <a:spAutoFit/>
-          </a:bodyPr>
-          <a:lstStyle/>
-          <a:p>
-            <a:r>
-              <a:rPr lang="en-US" dirty="0"/>
-              <a:t>(c) </a:t>
-            </a:r>
-          </a:p>
-        </p:txBody>
-      </p:sp>
-      <p:sp>
-        <p:nvSpPr>
-          <p:cNvPr id="25" name="Rectangle 24"/>
-          <p:cNvSpPr/>
-          <p:nvPr/>
-        </p:nvSpPr>
-        <p:spPr>
-          <a:xfrm rot="17317666">
-            <a:off x="4809696" y="5205587"/>
-            <a:ext cx="445930" cy="369332"/>
-          </a:xfrm>
-          <a:prstGeom prst="rect">
-            <a:avLst/>
-          </a:prstGeom>
-        </p:spPr>
-        <p:txBody>
-          <a:bodyPr wrap="none">
-            <a:spAutoFit/>
-          </a:bodyPr>
-          <a:lstStyle/>
-          <a:p>
-            <a:r>
-              <a:rPr lang="en-US" dirty="0" smtClean="0"/>
-              <a:t>(b) </a:t>
-            </a:r>
-            <a:endParaRPr lang="en-US" dirty="0"/>
-          </a:p>
-        </p:txBody>
-      </p:sp>
-      <p:sp>
-        <p:nvSpPr>
-          <p:cNvPr id="26" name="Rectangle 25"/>
-          <p:cNvSpPr/>
-          <p:nvPr/>
-        </p:nvSpPr>
-        <p:spPr>
-          <a:xfrm rot="4292969">
-            <a:off x="7302544" y="5219523"/>
-            <a:ext cx="422261" cy="369332"/>
-          </a:xfrm>
-          <a:prstGeom prst="rect">
-            <a:avLst/>
-          </a:prstGeom>
-        </p:spPr>
-        <p:txBody>
-          <a:bodyPr wrap="none">
-            <a:spAutoFit/>
-          </a:bodyPr>
-          <a:lstStyle/>
-          <a:p>
-            <a:r>
-              <a:rPr lang="en-US" dirty="0" smtClean="0"/>
-              <a:t>(c) </a:t>
-            </a:r>
-            <a:endParaRPr lang="en-US" dirty="0"/>
-          </a:p>
-        </p:txBody>
-      </p:sp>
-      <p:grpSp>
-        <p:nvGrpSpPr>
-          <p:cNvPr id="23" name="Group 22"/>
-          <p:cNvGrpSpPr/>
-          <p:nvPr/>
-        </p:nvGrpSpPr>
-        <p:grpSpPr>
-          <a:xfrm>
-            <a:off x="-329340" y="-409223"/>
-            <a:ext cx="8702219" cy="8454807"/>
-            <a:chOff x="-316640" y="-409223"/>
-            <a:chExt cx="8702219" cy="8454807"/>
-          </a:xfrm>
-        </p:grpSpPr>
-        <p:pic>
-          <p:nvPicPr>
-            <p:cNvPr id="5" name="Picture 4"/>
-            <p:cNvPicPr>
-              <a:picLocks noChangeAspect="1"/>
-            </p:cNvPicPr>
-            <p:nvPr/>
-          </p:nvPicPr>
-          <p:blipFill rotWithShape="1">
-            <a:blip r:embed="rId3"/>
-            <a:srcRect l="6560"/>
-            <a:stretch/>
-          </p:blipFill>
-          <p:spPr>
-            <a:xfrm>
-              <a:off x="4271433" y="3595504"/>
-              <a:ext cx="4077940" cy="4450080"/>
-            </a:xfrm>
-            <a:prstGeom prst="rect">
-              <a:avLst/>
-            </a:prstGeom>
-            <a:solidFill>
-              <a:srgbClr val="FFFFFF"/>
-            </a:solidFill>
-          </p:spPr>
-        </p:pic>
-        <p:grpSp>
-          <p:nvGrpSpPr>
-            <p:cNvPr id="22" name="Group 21"/>
-            <p:cNvGrpSpPr/>
-            <p:nvPr/>
-          </p:nvGrpSpPr>
-          <p:grpSpPr>
-            <a:xfrm>
-              <a:off x="-316640" y="-409223"/>
-              <a:ext cx="8702219" cy="8161490"/>
-              <a:chOff x="-316640" y="-409223"/>
-              <a:chExt cx="8702219" cy="8161490"/>
-            </a:xfrm>
-          </p:grpSpPr>
-          <p:pic>
-            <p:nvPicPr>
-              <p:cNvPr id="6" name="Picture 5"/>
-              <p:cNvPicPr>
-                <a:picLocks noChangeAspect="1"/>
-              </p:cNvPicPr>
-              <p:nvPr/>
-            </p:nvPicPr>
-            <p:blipFill rotWithShape="1">
-              <a:blip r:embed="rId4"/>
-              <a:srcRect t="9177"/>
-              <a:stretch/>
-            </p:blipFill>
-            <p:spPr>
-              <a:xfrm>
-                <a:off x="-232832" y="0"/>
-                <a:ext cx="4373058" cy="4049888"/>
-              </a:xfrm>
-              <a:prstGeom prst="rect">
-                <a:avLst/>
-              </a:prstGeom>
-              <a:solidFill>
-                <a:srgbClr val="FFFFFF"/>
-              </a:solidFill>
-            </p:spPr>
-          </p:pic>
-          <p:cxnSp>
-            <p:nvCxnSpPr>
-              <p:cNvPr id="7" name="Straight Connector 6"/>
-              <p:cNvCxnSpPr/>
-              <p:nvPr/>
-            </p:nvCxnSpPr>
-            <p:spPr>
-              <a:xfrm>
-                <a:off x="6297326" y="4085396"/>
-                <a:ext cx="0" cy="3399137"/>
-              </a:xfrm>
-              <a:prstGeom prst="line">
-                <a:avLst/>
-              </a:prstGeom>
-              <a:ln>
-                <a:solidFill>
-                  <a:schemeClr val="tx1"/>
-                </a:solidFill>
-                <a:prstDash val="dash"/>
-              </a:ln>
-            </p:spPr>
-            <p:style>
-              <a:lnRef idx="2">
-                <a:schemeClr val="accent1"/>
-              </a:lnRef>
-              <a:fillRef idx="0">
-                <a:schemeClr val="accent1"/>
-              </a:fillRef>
-              <a:effectRef idx="1">
-                <a:schemeClr val="accent1"/>
-              </a:effectRef>
-              <a:fontRef idx="minor">
-                <a:schemeClr val="tx1"/>
-              </a:fontRef>
-            </p:style>
-          </p:cxnSp>
-          <p:sp>
-            <p:nvSpPr>
-              <p:cNvPr id="8" name="TextBox 7"/>
-              <p:cNvSpPr txBox="1"/>
-              <p:nvPr/>
-            </p:nvSpPr>
-            <p:spPr>
-              <a:xfrm>
-                <a:off x="6160863" y="7382935"/>
-                <a:ext cx="301660" cy="369332"/>
-              </a:xfrm>
-              <a:prstGeom prst="rect">
-                <a:avLst/>
-              </a:prstGeom>
-              <a:noFill/>
-            </p:spPr>
-            <p:txBody>
-              <a:bodyPr wrap="none" rtlCol="0">
-                <a:spAutoFit/>
-              </a:bodyPr>
-              <a:lstStyle/>
-              <a:p>
-                <a:r>
-                  <a:rPr lang="en-US" dirty="0" smtClean="0"/>
-                  <a:t>0</a:t>
-                </a:r>
-                <a:endParaRPr lang="en-US" dirty="0"/>
-              </a:p>
-            </p:txBody>
-          </p:sp>
-          <p:sp>
-            <p:nvSpPr>
-              <p:cNvPr id="9" name="TextBox 8"/>
-              <p:cNvSpPr txBox="1"/>
-              <p:nvPr/>
-            </p:nvSpPr>
-            <p:spPr>
-              <a:xfrm>
-                <a:off x="5805201" y="4084336"/>
-                <a:ext cx="942820" cy="430887"/>
-              </a:xfrm>
-              <a:prstGeom prst="rect">
-                <a:avLst/>
-              </a:prstGeom>
-              <a:solidFill>
-                <a:schemeClr val="tx2">
-                  <a:lumMod val="40000"/>
-                  <a:lumOff val="60000"/>
-                </a:schemeClr>
-              </a:solidFill>
-              <a:ln>
-                <a:solidFill>
-                  <a:schemeClr val="tx1"/>
-                </a:solidFill>
-                <a:prstDash val="solid"/>
-              </a:ln>
-            </p:spPr>
-            <p:txBody>
-              <a:bodyPr wrap="square" rtlCol="0">
-                <a:spAutoFit/>
-              </a:bodyPr>
-              <a:lstStyle/>
-              <a:p>
-                <a:pPr algn="ctr"/>
-                <a:r>
-                  <a:rPr lang="en-US" sz="2200" b="1" dirty="0" smtClean="0"/>
-                  <a:t>match</a:t>
-                </a:r>
-                <a:endParaRPr lang="en-US" sz="2200" b="1" dirty="0"/>
-              </a:p>
-            </p:txBody>
-          </p:sp>
-          <p:sp>
-            <p:nvSpPr>
-              <p:cNvPr id="10" name="TextBox 9"/>
-              <p:cNvSpPr txBox="1"/>
-              <p:nvPr/>
-            </p:nvSpPr>
-            <p:spPr>
-              <a:xfrm rot="4253040">
-                <a:off x="6506386" y="5449077"/>
-                <a:ext cx="1332053" cy="430887"/>
-              </a:xfrm>
-              <a:prstGeom prst="rect">
-                <a:avLst/>
-              </a:prstGeom>
-              <a:solidFill>
-                <a:srgbClr val="FF0000">
-                  <a:alpha val="77000"/>
-                </a:srgbClr>
-              </a:solidFill>
-              <a:ln>
-                <a:solidFill>
-                  <a:schemeClr val="tx1"/>
-                </a:solidFill>
-              </a:ln>
-            </p:spPr>
-            <p:txBody>
-              <a:bodyPr wrap="none" rtlCol="0">
-                <a:spAutoFit/>
-              </a:bodyPr>
-              <a:lstStyle/>
-              <a:p>
-                <a:r>
-                  <a:rPr lang="en-US" sz="2200" b="1" dirty="0" smtClean="0"/>
-                  <a:t>mismatch</a:t>
-                </a:r>
-                <a:endParaRPr lang="en-US" sz="2200" b="1" dirty="0"/>
-              </a:p>
-            </p:txBody>
-          </p:sp>
-          <p:sp>
-            <p:nvSpPr>
-              <p:cNvPr id="11" name="Right Arrow 10"/>
-              <p:cNvSpPr/>
-              <p:nvPr/>
-            </p:nvSpPr>
-            <p:spPr>
-              <a:xfrm rot="3973453">
-                <a:off x="6559804" y="4610704"/>
-                <a:ext cx="537208" cy="375539"/>
-              </a:xfrm>
-              <a:prstGeom prst="rightArrow">
-                <a:avLst/>
-              </a:prstGeom>
-              <a:solidFill>
-                <a:srgbClr val="D9D9D9"/>
-              </a:solidFill>
-              <a:ln>
-                <a:solidFill>
-                  <a:schemeClr val="tx1"/>
-                </a:solidFill>
-              </a:ln>
-              <a:effectLst/>
-            </p:spPr>
-            <p:style>
-              <a:lnRef idx="1">
-                <a:schemeClr val="accent1"/>
-              </a:lnRef>
-              <a:fillRef idx="3">
-                <a:schemeClr val="accent1"/>
-              </a:fillRef>
-              <a:effectRef idx="2">
-                <a:schemeClr val="accent1"/>
-              </a:effectRef>
-              <a:fontRef idx="minor">
-                <a:schemeClr val="lt1"/>
-              </a:fontRef>
-            </p:style>
-            <p:txBody>
-              <a:bodyPr rtlCol="0" anchor="ctr"/>
-              <a:lstStyle/>
-              <a:p>
-                <a:pPr algn="ctr"/>
-                <a:endParaRPr lang="en-US"/>
-              </a:p>
-            </p:txBody>
-          </p:sp>
-          <p:sp>
-            <p:nvSpPr>
-              <p:cNvPr id="12" name="TextBox 11"/>
-              <p:cNvSpPr txBox="1"/>
-              <p:nvPr/>
-            </p:nvSpPr>
-            <p:spPr>
-              <a:xfrm rot="17332499">
-                <a:off x="4723797" y="5440594"/>
-                <a:ext cx="1332053" cy="430887"/>
-              </a:xfrm>
-              <a:prstGeom prst="rect">
-                <a:avLst/>
-              </a:prstGeom>
-              <a:solidFill>
-                <a:srgbClr val="FF0000">
-                  <a:alpha val="77000"/>
-                </a:srgbClr>
-              </a:solidFill>
-              <a:ln>
-                <a:solidFill>
-                  <a:schemeClr val="tx1"/>
-                </a:solidFill>
-              </a:ln>
-            </p:spPr>
-            <p:txBody>
-              <a:bodyPr wrap="none" rtlCol="0">
-                <a:spAutoFit/>
-              </a:bodyPr>
-              <a:lstStyle/>
-              <a:p>
-                <a:r>
-                  <a:rPr lang="en-US" sz="2200" b="1" dirty="0" smtClean="0"/>
-                  <a:t>mismatch</a:t>
-                </a:r>
-                <a:endParaRPr lang="en-US" sz="2200" b="1" dirty="0"/>
-              </a:p>
-            </p:txBody>
-          </p:sp>
-          <p:sp>
-            <p:nvSpPr>
-              <p:cNvPr id="13" name="Right Arrow 12"/>
-              <p:cNvSpPr/>
-              <p:nvPr/>
-            </p:nvSpPr>
-            <p:spPr>
-              <a:xfrm rot="6985390">
-                <a:off x="5453672" y="4604345"/>
-                <a:ext cx="537208" cy="375539"/>
-              </a:xfrm>
-              <a:prstGeom prst="rightArrow">
-                <a:avLst/>
-              </a:prstGeom>
-              <a:solidFill>
-                <a:srgbClr val="D9D9D9"/>
-              </a:solidFill>
-              <a:ln>
-                <a:solidFill>
-                  <a:schemeClr val="tx1"/>
-                </a:solidFill>
-              </a:ln>
-              <a:effectLst/>
-            </p:spPr>
-            <p:style>
-              <a:lnRef idx="1">
-                <a:schemeClr val="accent1"/>
-              </a:lnRef>
-              <a:fillRef idx="3">
-                <a:schemeClr val="accent1"/>
-              </a:fillRef>
-              <a:effectRef idx="2">
-                <a:schemeClr val="accent1"/>
-              </a:effectRef>
-              <a:fontRef idx="minor">
-                <a:schemeClr val="lt1"/>
-              </a:fontRef>
-            </p:style>
-            <p:txBody>
-              <a:bodyPr rtlCol="0" anchor="ctr"/>
-              <a:lstStyle/>
-              <a:p>
-                <a:pPr algn="ctr"/>
-                <a:endParaRPr lang="en-US"/>
-              </a:p>
-            </p:txBody>
-          </p:sp>
-          <p:pic>
-            <p:nvPicPr>
-              <p:cNvPr id="3" name="Picture 2"/>
-              <p:cNvPicPr>
-                <a:picLocks noChangeAspect="1"/>
-              </p:cNvPicPr>
-              <p:nvPr/>
-            </p:nvPicPr>
-            <p:blipFill rotWithShape="1">
-              <a:blip r:embed="rId5"/>
-              <a:srcRect l="6269" b="1127"/>
-              <a:stretch/>
-            </p:blipFill>
-            <p:spPr>
-              <a:xfrm>
-                <a:off x="4271433" y="-409223"/>
-                <a:ext cx="4114146" cy="4425244"/>
-              </a:xfrm>
-              <a:prstGeom prst="rect">
-                <a:avLst/>
-              </a:prstGeom>
-            </p:spPr>
-          </p:pic>
-          <p:sp>
-            <p:nvSpPr>
-              <p:cNvPr id="14" name="TextBox 13"/>
-              <p:cNvSpPr txBox="1"/>
-              <p:nvPr/>
-            </p:nvSpPr>
-            <p:spPr>
-              <a:xfrm>
-                <a:off x="243143" y="79601"/>
-                <a:ext cx="405354" cy="430887"/>
-              </a:xfrm>
-              <a:prstGeom prst="rect">
-                <a:avLst/>
-              </a:prstGeom>
-              <a:solidFill>
-                <a:srgbClr val="FFFFFF"/>
-              </a:solidFill>
-              <a:ln>
-                <a:noFill/>
-                <a:prstDash val="solid"/>
-              </a:ln>
-            </p:spPr>
-            <p:txBody>
-              <a:bodyPr wrap="none" rtlCol="0">
-                <a:spAutoFit/>
-              </a:bodyPr>
-              <a:lstStyle/>
-              <a:p>
-                <a:r>
-                  <a:rPr lang="en-US" sz="2200" dirty="0" smtClean="0"/>
-                  <a:t>a)</a:t>
-                </a:r>
-                <a:endParaRPr lang="en-US" sz="2200" dirty="0"/>
-              </a:p>
-            </p:txBody>
-          </p:sp>
-          <p:sp>
-            <p:nvSpPr>
-              <p:cNvPr id="15" name="TextBox 14"/>
-              <p:cNvSpPr txBox="1"/>
-              <p:nvPr/>
-            </p:nvSpPr>
-            <p:spPr>
-              <a:xfrm>
-                <a:off x="4490984" y="79601"/>
-                <a:ext cx="418441" cy="430887"/>
-              </a:xfrm>
-              <a:prstGeom prst="rect">
-                <a:avLst/>
-              </a:prstGeom>
-              <a:solidFill>
-                <a:srgbClr val="FFFFFF"/>
-              </a:solidFill>
-              <a:ln>
-                <a:noFill/>
-                <a:prstDash val="solid"/>
-              </a:ln>
-            </p:spPr>
-            <p:txBody>
-              <a:bodyPr wrap="none" rtlCol="0">
-                <a:spAutoFit/>
-              </a:bodyPr>
-              <a:lstStyle/>
-              <a:p>
-                <a:r>
-                  <a:rPr lang="en-US" sz="2200" dirty="0"/>
-                  <a:t>b</a:t>
-                </a:r>
-                <a:r>
-                  <a:rPr lang="en-US" sz="2200" dirty="0" smtClean="0"/>
-                  <a:t>)</a:t>
-                </a:r>
-                <a:endParaRPr lang="en-US" sz="2200" dirty="0"/>
-              </a:p>
-            </p:txBody>
-          </p:sp>
-          <p:sp>
-            <p:nvSpPr>
-              <p:cNvPr id="18" name="TextBox 17"/>
-              <p:cNvSpPr txBox="1"/>
-              <p:nvPr/>
-            </p:nvSpPr>
-            <p:spPr>
-              <a:xfrm>
-                <a:off x="209277" y="4085396"/>
-                <a:ext cx="389512" cy="430887"/>
-              </a:xfrm>
-              <a:prstGeom prst="rect">
-                <a:avLst/>
-              </a:prstGeom>
-              <a:solidFill>
-                <a:srgbClr val="FFFFFF"/>
-              </a:solidFill>
-              <a:ln>
-                <a:noFill/>
-                <a:prstDash val="solid"/>
-              </a:ln>
-            </p:spPr>
-            <p:txBody>
-              <a:bodyPr wrap="none" rtlCol="0">
-                <a:spAutoFit/>
-              </a:bodyPr>
-              <a:lstStyle/>
-              <a:p>
-                <a:r>
-                  <a:rPr lang="en-US" sz="2200" dirty="0" smtClean="0"/>
-                  <a:t>c)</a:t>
-                </a:r>
-                <a:endParaRPr lang="en-US" sz="2200" dirty="0"/>
-              </a:p>
-            </p:txBody>
-          </p:sp>
-          <p:sp>
-            <p:nvSpPr>
-              <p:cNvPr id="19" name="TextBox 18"/>
-              <p:cNvSpPr txBox="1"/>
-              <p:nvPr/>
-            </p:nvSpPr>
-            <p:spPr>
-              <a:xfrm>
-                <a:off x="4474916" y="4085396"/>
-                <a:ext cx="418441" cy="430887"/>
-              </a:xfrm>
-              <a:prstGeom prst="rect">
-                <a:avLst/>
-              </a:prstGeom>
-              <a:solidFill>
-                <a:srgbClr val="FFFFFF"/>
-              </a:solidFill>
-              <a:ln>
-                <a:noFill/>
-                <a:prstDash val="solid"/>
-              </a:ln>
-            </p:spPr>
-            <p:txBody>
-              <a:bodyPr wrap="none" rtlCol="0">
-                <a:spAutoFit/>
-              </a:bodyPr>
-              <a:lstStyle/>
-              <a:p>
-                <a:r>
-                  <a:rPr lang="en-US" sz="2200" dirty="0"/>
-                  <a:t>d</a:t>
-                </a:r>
-                <a:r>
-                  <a:rPr lang="en-US" sz="2200" dirty="0" smtClean="0"/>
-                  <a:t>)</a:t>
-                </a:r>
-                <a:endParaRPr lang="en-US" sz="2200" dirty="0"/>
-              </a:p>
-            </p:txBody>
-          </p:sp>
-          <p:sp>
-            <p:nvSpPr>
-              <p:cNvPr id="20" name="TextBox 19"/>
-              <p:cNvSpPr txBox="1"/>
-              <p:nvPr/>
-            </p:nvSpPr>
-            <p:spPr>
-              <a:xfrm rot="16200000">
-                <a:off x="-974124" y="1379323"/>
-                <a:ext cx="1838188" cy="523220"/>
-              </a:xfrm>
-              <a:prstGeom prst="rect">
-                <a:avLst/>
-              </a:prstGeom>
-              <a:solidFill>
-                <a:srgbClr val="FFFFFF"/>
-              </a:solidFill>
-            </p:spPr>
-            <p:txBody>
-              <a:bodyPr wrap="none" rtlCol="0">
-                <a:spAutoFit/>
-              </a:bodyPr>
-              <a:lstStyle/>
-              <a:p>
-                <a:r>
-                  <a:rPr lang="en-US" sz="2800" dirty="0" smtClean="0"/>
-                  <a:t>Abundance</a:t>
-                </a:r>
-                <a:endParaRPr lang="en-US" sz="2800" dirty="0"/>
-              </a:p>
-            </p:txBody>
-          </p:sp>
-        </p:grpSp>
-      </p:grpSp>
-      <p:sp>
-        <p:nvSpPr>
-          <p:cNvPr id="17" name="Rectangle 16"/>
-          <p:cNvSpPr/>
-          <p:nvPr/>
-        </p:nvSpPr>
-        <p:spPr>
-          <a:xfrm>
-            <a:off x="5396773" y="4107633"/>
-            <a:ext cx="435223" cy="369332"/>
-          </a:xfrm>
-          <a:prstGeom prst="rect">
-            <a:avLst/>
-          </a:prstGeom>
-        </p:spPr>
-        <p:txBody>
-          <a:bodyPr wrap="none">
-            <a:spAutoFit/>
-          </a:bodyPr>
-          <a:lstStyle/>
-          <a:p>
-            <a:r>
-              <a:rPr lang="en-US" dirty="0"/>
-              <a:t>(a) </a:t>
-            </a:r>
-          </a:p>
-        </p:txBody>
-      </p:sp>
-      <p:sp>
-        <p:nvSpPr>
-          <p:cNvPr id="28" name="TextBox 27"/>
-          <p:cNvSpPr txBox="1"/>
-          <p:nvPr/>
-        </p:nvSpPr>
-        <p:spPr>
-          <a:xfrm rot="16200000">
-            <a:off x="3554062" y="5468514"/>
-            <a:ext cx="1200519" cy="523220"/>
-          </a:xfrm>
-          <a:prstGeom prst="rect">
-            <a:avLst/>
-          </a:prstGeom>
-          <a:solidFill>
-            <a:srgbClr val="FFFFFF"/>
-          </a:solidFill>
-        </p:spPr>
-        <p:txBody>
-          <a:bodyPr wrap="none" rtlCol="0">
-            <a:spAutoFit/>
-          </a:bodyPr>
-          <a:lstStyle/>
-          <a:p>
-            <a:r>
-              <a:rPr lang="en-US" sz="2800" dirty="0" smtClean="0"/>
-              <a:t>Fitness</a:t>
-            </a:r>
-            <a:endParaRPr lang="en-US" sz="2800" dirty="0"/>
-          </a:p>
-        </p:txBody>
-      </p:sp>
-      <p:sp>
-        <p:nvSpPr>
-          <p:cNvPr id="29" name="TextBox 28"/>
-          <p:cNvSpPr txBox="1"/>
-          <p:nvPr/>
-        </p:nvSpPr>
-        <p:spPr>
-          <a:xfrm rot="16200000">
-            <a:off x="3263439" y="1379322"/>
-            <a:ext cx="1838188" cy="523220"/>
-          </a:xfrm>
-          <a:prstGeom prst="rect">
-            <a:avLst/>
-          </a:prstGeom>
-          <a:solidFill>
-            <a:srgbClr val="FFFFFF"/>
-          </a:solidFill>
-        </p:spPr>
-        <p:txBody>
-          <a:bodyPr wrap="none" rtlCol="0">
-            <a:spAutoFit/>
-          </a:bodyPr>
-          <a:lstStyle/>
-          <a:p>
-            <a:r>
-              <a:rPr lang="en-US" sz="2800" dirty="0" smtClean="0"/>
-              <a:t>Abundance</a:t>
-            </a:r>
-            <a:endParaRPr lang="en-US" sz="2800" dirty="0"/>
-          </a:p>
-        </p:txBody>
-      </p:sp>
-      <p:sp>
-        <p:nvSpPr>
-          <p:cNvPr id="31" name="Rectangle 30"/>
-          <p:cNvSpPr/>
-          <p:nvPr/>
-        </p:nvSpPr>
-        <p:spPr>
-          <a:xfrm rot="17276937">
-            <a:off x="4787497" y="5261448"/>
-            <a:ext cx="445930" cy="369332"/>
-          </a:xfrm>
-          <a:prstGeom prst="rect">
-            <a:avLst/>
-          </a:prstGeom>
-        </p:spPr>
-        <p:txBody>
-          <a:bodyPr wrap="none">
-            <a:spAutoFit/>
-          </a:bodyPr>
-          <a:lstStyle/>
-          <a:p>
-            <a:r>
-              <a:rPr lang="en-US" dirty="0" smtClean="0"/>
-              <a:t>(b) </a:t>
-            </a:r>
-            <a:endParaRPr lang="en-US" dirty="0"/>
-          </a:p>
-        </p:txBody>
-      </p:sp>
-      <p:sp>
-        <p:nvSpPr>
-          <p:cNvPr id="32" name="Rectangle 31"/>
-          <p:cNvSpPr/>
-          <p:nvPr/>
-        </p:nvSpPr>
-        <p:spPr>
-          <a:xfrm rot="4181040">
-            <a:off x="7292104" y="5192099"/>
-            <a:ext cx="422261" cy="369332"/>
-          </a:xfrm>
-          <a:prstGeom prst="rect">
-            <a:avLst/>
-          </a:prstGeom>
-        </p:spPr>
-        <p:txBody>
-          <a:bodyPr wrap="none">
-            <a:spAutoFit/>
-          </a:bodyPr>
-          <a:lstStyle/>
-          <a:p>
-            <a:r>
-              <a:rPr lang="en-US" dirty="0" smtClean="0"/>
-              <a:t>(c) </a:t>
-            </a:r>
-            <a:endParaRPr lang="en-US" dirty="0"/>
-          </a:p>
-        </p:txBody>
-      </p:sp>
-      <p:pic>
-        <p:nvPicPr>
-          <p:cNvPr id="34" name="Picture 33"/>
-          <p:cNvPicPr>
-            <a:picLocks noChangeAspect="1"/>
-          </p:cNvPicPr>
-          <p:nvPr/>
-        </p:nvPicPr>
-        <p:blipFill rotWithShape="1">
-          <a:blip r:embed="rId6"/>
-          <a:srcRect r="4706"/>
-          <a:stretch/>
-        </p:blipFill>
-        <p:spPr>
-          <a:xfrm>
-            <a:off x="-600269" y="3456482"/>
-            <a:ext cx="4538125" cy="4732566"/>
-          </a:xfrm>
-          <a:prstGeom prst="rect">
-            <a:avLst/>
-          </a:prstGeom>
-          <a:solidFill>
-            <a:schemeClr val="bg1"/>
-          </a:solidFill>
-        </p:spPr>
-      </p:pic>
-      <p:cxnSp>
-        <p:nvCxnSpPr>
-          <p:cNvPr id="36" name="Straight Connector 35"/>
-          <p:cNvCxnSpPr>
-            <a:endCxn id="38" idx="0"/>
-          </p:cNvCxnSpPr>
-          <p:nvPr/>
-        </p:nvCxnSpPr>
-        <p:spPr>
-          <a:xfrm flipH="1">
-            <a:off x="1913468" y="4271662"/>
-            <a:ext cx="2360" cy="1961712"/>
-          </a:xfrm>
-          <a:prstGeom prst="line">
-            <a:avLst/>
-          </a:prstGeom>
-          <a:ln>
-            <a:solidFill>
-              <a:schemeClr val="tx1"/>
-            </a:solidFill>
-            <a:prstDash val="dash"/>
-          </a:ln>
-        </p:spPr>
-        <p:style>
-          <a:lnRef idx="2">
-            <a:schemeClr val="accent1"/>
-          </a:lnRef>
-          <a:fillRef idx="0">
-            <a:schemeClr val="accent1"/>
-          </a:fillRef>
-          <a:effectRef idx="1">
-            <a:schemeClr val="accent1"/>
-          </a:effectRef>
-          <a:fontRef idx="minor">
-            <a:schemeClr val="tx1"/>
-          </a:fontRef>
-        </p:style>
-      </p:cxnSp>
-      <p:sp>
-        <p:nvSpPr>
-          <p:cNvPr id="35" name="TextBox 34"/>
-          <p:cNvSpPr txBox="1"/>
-          <p:nvPr/>
-        </p:nvSpPr>
-        <p:spPr>
-          <a:xfrm>
-            <a:off x="1355969" y="4066820"/>
-            <a:ext cx="1200966" cy="430887"/>
-          </a:xfrm>
-          <a:prstGeom prst="rect">
-            <a:avLst/>
-          </a:prstGeom>
-          <a:solidFill>
-            <a:schemeClr val="tx2">
-              <a:lumMod val="40000"/>
-              <a:lumOff val="60000"/>
-            </a:schemeClr>
-          </a:solidFill>
-          <a:ln>
-            <a:solidFill>
-              <a:schemeClr val="tx1"/>
-            </a:solidFill>
-            <a:prstDash val="solid"/>
-          </a:ln>
-        </p:spPr>
-        <p:txBody>
-          <a:bodyPr wrap="square" rtlCol="0">
-            <a:spAutoFit/>
-          </a:bodyPr>
-          <a:lstStyle/>
-          <a:p>
-            <a:pPr algn="ctr"/>
-            <a:r>
-              <a:rPr lang="en-US" sz="2200" b="1" dirty="0" smtClean="0"/>
-              <a:t>baseline</a:t>
-            </a:r>
-            <a:endParaRPr lang="en-US" sz="2200" b="1" dirty="0"/>
-          </a:p>
-        </p:txBody>
-      </p:sp>
-      <p:sp>
-        <p:nvSpPr>
-          <p:cNvPr id="37" name="TextBox 36"/>
-          <p:cNvSpPr txBox="1"/>
-          <p:nvPr/>
-        </p:nvSpPr>
-        <p:spPr>
-          <a:xfrm>
-            <a:off x="1813230" y="7366005"/>
-            <a:ext cx="301660" cy="369332"/>
-          </a:xfrm>
-          <a:prstGeom prst="rect">
-            <a:avLst/>
-          </a:prstGeom>
-          <a:noFill/>
-        </p:spPr>
-        <p:txBody>
-          <a:bodyPr wrap="none" rtlCol="0">
-            <a:spAutoFit/>
-          </a:bodyPr>
-          <a:lstStyle/>
-          <a:p>
-            <a:r>
-              <a:rPr lang="en-US" dirty="0" smtClean="0"/>
-              <a:t>0</a:t>
-            </a:r>
-            <a:endParaRPr lang="en-US" dirty="0"/>
-          </a:p>
-        </p:txBody>
-      </p:sp>
-      <p:sp>
-        <p:nvSpPr>
-          <p:cNvPr id="38" name="Rectangle 37"/>
-          <p:cNvSpPr/>
-          <p:nvPr/>
-        </p:nvSpPr>
-        <p:spPr>
-          <a:xfrm>
-            <a:off x="1032934" y="6233374"/>
-            <a:ext cx="1761067" cy="569204"/>
-          </a:xfrm>
-          <a:prstGeom prst="rect">
-            <a:avLst/>
-          </a:prstGeom>
-          <a:noFill/>
-          <a:ln w="38100" cmpd="sng">
-            <a:solidFill>
-              <a:srgbClr val="FF0000"/>
-            </a:solidFill>
-            <a:prstDash val="solid"/>
-          </a:ln>
-          <a:effectLst/>
-        </p:spPr>
-        <p:style>
-          <a:lnRef idx="1">
-            <a:schemeClr val="accent1"/>
-          </a:lnRef>
-          <a:fillRef idx="3">
-            <a:schemeClr val="accent1"/>
-          </a:fillRef>
-          <a:effectRef idx="2">
-            <a:schemeClr val="accent1"/>
-          </a:effectRef>
-          <a:fontRef idx="minor">
-            <a:schemeClr val="lt1"/>
-          </a:fontRef>
-        </p:style>
-        <p:txBody>
-          <a:bodyPr rtlCol="0" anchor="ctr"/>
-          <a:lstStyle/>
-          <a:p>
-            <a:pPr algn="ctr"/>
-            <a:endParaRPr lang="en-US"/>
-          </a:p>
-        </p:txBody>
-      </p:sp>
-      <p:sp>
-        <p:nvSpPr>
-          <p:cNvPr id="39" name="Rectangle 38"/>
-          <p:cNvSpPr/>
-          <p:nvPr/>
-        </p:nvSpPr>
-        <p:spPr>
-          <a:xfrm>
-            <a:off x="1393419" y="6182575"/>
-            <a:ext cx="1161922" cy="430887"/>
-          </a:xfrm>
-          <a:prstGeom prst="rect">
-            <a:avLst/>
-          </a:prstGeom>
-        </p:spPr>
-        <p:txBody>
-          <a:bodyPr wrap="none">
-            <a:spAutoFit/>
-          </a:bodyPr>
-          <a:lstStyle/>
-          <a:p>
-            <a:r>
-              <a:rPr lang="en-US" sz="2200" b="1" dirty="0">
-                <a:solidFill>
-                  <a:srgbClr val="FF0000"/>
-                </a:solidFill>
-              </a:rPr>
-              <a:t>b</a:t>
-            </a:r>
-            <a:r>
-              <a:rPr lang="en-US" sz="2200" b="1" dirty="0" smtClean="0">
-                <a:solidFill>
-                  <a:srgbClr val="FF0000"/>
-                </a:solidFill>
-              </a:rPr>
-              <a:t>aseline</a:t>
-            </a:r>
-            <a:endParaRPr lang="en-US" sz="2200" b="1" dirty="0">
-              <a:solidFill>
-                <a:srgbClr val="FF0000"/>
-              </a:solidFill>
-            </a:endParaRPr>
-          </a:p>
-        </p:txBody>
-      </p:sp>
-      <p:cxnSp>
-        <p:nvCxnSpPr>
-          <p:cNvPr id="40" name="Straight Connector 39"/>
-          <p:cNvCxnSpPr/>
-          <p:nvPr/>
-        </p:nvCxnSpPr>
-        <p:spPr>
-          <a:xfrm flipH="1">
-            <a:off x="1947334" y="6794727"/>
-            <a:ext cx="4718" cy="689806"/>
-          </a:xfrm>
-          <a:prstGeom prst="line">
-            <a:avLst/>
-          </a:prstGeom>
-          <a:ln>
-            <a:solidFill>
-              <a:schemeClr val="tx1"/>
-            </a:solidFill>
-            <a:prstDash val="dash"/>
-          </a:ln>
-        </p:spPr>
-        <p:style>
-          <a:lnRef idx="2">
-            <a:schemeClr val="accent1"/>
-          </a:lnRef>
-          <a:fillRef idx="0">
-            <a:schemeClr val="accent1"/>
-          </a:fillRef>
-          <a:effectRef idx="1">
-            <a:schemeClr val="accent1"/>
-          </a:effectRef>
-          <a:fontRef idx="minor">
-            <a:schemeClr val="tx1"/>
-          </a:fontRef>
-        </p:style>
-      </p:cxnSp>
-    </p:spTree>
-    <p:extLst>
-      <p:ext uri="{BB962C8B-B14F-4D97-AF65-F5344CB8AC3E}">
-        <p14:creationId xmlns:p14="http://schemas.microsoft.com/office/powerpoint/2010/main" val="3779221071"/>
-      </p:ext>
-    </p:extLst>
-  </p:cSld>
-  <p:clrMapOvr>
-    <a:masterClrMapping/>
-  </p:clrMapOvr>
-</p:sld>
-</file>
-
-<file path=ppt/slides/slide14.xml><?xml version="1.0" encoding="utf-8"?>
+<file path=ppt/slides/slide15.xml><?xml version="1.0" encoding="utf-8"?>
 <p:sld xmlns:a="http://schemas.openxmlformats.org/drawingml/2006/main" xmlns:r="http://schemas.openxmlformats.org/officeDocument/2006/relationships" xmlns:p="http://schemas.openxmlformats.org/presentationml/2006/main">
   <p:cSld>
     <p:spTree>
@@ -6956,7 +8364,7 @@
 </p:sld>
 </file>
 
-<file path=ppt/slides/slide15.xml><?xml version="1.0" encoding="utf-8"?>
+<file path=ppt/slides/slide16.xml><?xml version="1.0" encoding="utf-8"?>
 <p:sld xmlns:a="http://schemas.openxmlformats.org/drawingml/2006/main" xmlns:r="http://schemas.openxmlformats.org/officeDocument/2006/relationships" xmlns:p="http://schemas.openxmlformats.org/presentationml/2006/main">
   <p:cSld>
     <p:spTree>

</xml_diff>